<commit_message>
Final commit of proposal
</commit_message>
<xml_diff>
--- a/CSML-1010-Group 20.pptx
+++ b/CSML-1010-Group 20.pptx
@@ -8,6 +8,14 @@
     <p:sldId id="256" r:id="rId2"/>
     <p:sldId id="257" r:id="rId3"/>
     <p:sldId id="258" r:id="rId4"/>
+    <p:sldId id="259" r:id="rId5"/>
+    <p:sldId id="260" r:id="rId6"/>
+    <p:sldId id="261" r:id="rId7"/>
+    <p:sldId id="262" r:id="rId8"/>
+    <p:sldId id="263" r:id="rId9"/>
+    <p:sldId id="264" r:id="rId10"/>
+    <p:sldId id="265" r:id="rId11"/>
+    <p:sldId id="266" r:id="rId12"/>
   </p:sldIdLst>
   <p:sldSz cx="12192000" cy="6858000"/>
   <p:notesSz cx="6858000" cy="9144000"/>
@@ -106,6 +114,11 @@
       </a:defRPr>
     </a:lvl9pPr>
   </p:defaultTextStyle>
+  <p:extLst>
+    <p:ext uri="{EFAFB233-063F-42B5-8137-9DF3F51BA10A}">
+      <p15:sldGuideLst xmlns:p15="http://schemas.microsoft.com/office/powerpoint/2012/main"/>
+    </p:ext>
+  </p:extLst>
 </p:presentation>
 </file>
 
@@ -831,7 +844,7 @@
           <a:p>
             <a:fld id="{E5B832BA-C66E-4618-9CDA-BB5B0FBA9FBA}" type="datetimeFigureOut">
               <a:rPr lang="en-CA" smtClean="0"/>
-              <a:t>2020-03-26</a:t>
+              <a:t>2020-03-29</a:t>
             </a:fld>
             <a:endParaRPr lang="en-CA"/>
           </a:p>
@@ -1082,7 +1095,7 @@
           <a:p>
             <a:fld id="{E5B832BA-C66E-4618-9CDA-BB5B0FBA9FBA}" type="datetimeFigureOut">
               <a:rPr lang="en-CA" smtClean="0"/>
-              <a:t>2020-03-26</a:t>
+              <a:t>2020-03-29</a:t>
             </a:fld>
             <a:endParaRPr lang="en-CA"/>
           </a:p>
@@ -1396,7 +1409,7 @@
           <a:p>
             <a:fld id="{E5B832BA-C66E-4618-9CDA-BB5B0FBA9FBA}" type="datetimeFigureOut">
               <a:rPr lang="en-CA" smtClean="0"/>
-              <a:t>2020-03-26</a:t>
+              <a:t>2020-03-29</a:t>
             </a:fld>
             <a:endParaRPr lang="en-CA"/>
           </a:p>
@@ -1737,7 +1750,7 @@
           <a:p>
             <a:fld id="{E5B832BA-C66E-4618-9CDA-BB5B0FBA9FBA}" type="datetimeFigureOut">
               <a:rPr lang="en-CA" smtClean="0"/>
-              <a:t>2020-03-26</a:t>
+              <a:t>2020-03-29</a:t>
             </a:fld>
             <a:endParaRPr lang="en-CA"/>
           </a:p>
@@ -2051,7 +2064,7 @@
           <a:p>
             <a:fld id="{E5B832BA-C66E-4618-9CDA-BB5B0FBA9FBA}" type="datetimeFigureOut">
               <a:rPr lang="en-CA" smtClean="0"/>
-              <a:t>2020-03-26</a:t>
+              <a:t>2020-03-29</a:t>
             </a:fld>
             <a:endParaRPr lang="en-CA"/>
           </a:p>
@@ -2444,7 +2457,7 @@
           <a:p>
             <a:fld id="{E5B832BA-C66E-4618-9CDA-BB5B0FBA9FBA}" type="datetimeFigureOut">
               <a:rPr lang="en-CA" smtClean="0"/>
-              <a:t>2020-03-26</a:t>
+              <a:t>2020-03-29</a:t>
             </a:fld>
             <a:endParaRPr lang="en-CA"/>
           </a:p>
@@ -2614,7 +2627,7 @@
           <a:p>
             <a:fld id="{E5B832BA-C66E-4618-9CDA-BB5B0FBA9FBA}" type="datetimeFigureOut">
               <a:rPr lang="en-CA" smtClean="0"/>
-              <a:t>2020-03-26</a:t>
+              <a:t>2020-03-29</a:t>
             </a:fld>
             <a:endParaRPr lang="en-CA"/>
           </a:p>
@@ -2794,7 +2807,7 @@
           <a:p>
             <a:fld id="{E5B832BA-C66E-4618-9CDA-BB5B0FBA9FBA}" type="datetimeFigureOut">
               <a:rPr lang="en-CA" smtClean="0"/>
-              <a:t>2020-03-26</a:t>
+              <a:t>2020-03-29</a:t>
             </a:fld>
             <a:endParaRPr lang="en-CA"/>
           </a:p>
@@ -2970,7 +2983,7 @@
           <a:p>
             <a:fld id="{E5B832BA-C66E-4618-9CDA-BB5B0FBA9FBA}" type="datetimeFigureOut">
               <a:rPr lang="en-CA" smtClean="0"/>
-              <a:t>2020-03-26</a:t>
+              <a:t>2020-03-29</a:t>
             </a:fld>
             <a:endParaRPr lang="en-CA"/>
           </a:p>
@@ -3217,7 +3230,7 @@
           <a:p>
             <a:fld id="{E5B832BA-C66E-4618-9CDA-BB5B0FBA9FBA}" type="datetimeFigureOut">
               <a:rPr lang="en-CA" smtClean="0"/>
-              <a:t>2020-03-26</a:t>
+              <a:t>2020-03-29</a:t>
             </a:fld>
             <a:endParaRPr lang="en-CA"/>
           </a:p>
@@ -3449,7 +3462,7 @@
           <a:p>
             <a:fld id="{E5B832BA-C66E-4618-9CDA-BB5B0FBA9FBA}" type="datetimeFigureOut">
               <a:rPr lang="en-CA" smtClean="0"/>
-              <a:t>2020-03-26</a:t>
+              <a:t>2020-03-29</a:t>
             </a:fld>
             <a:endParaRPr lang="en-CA"/>
           </a:p>
@@ -3823,7 +3836,7 @@
           <a:p>
             <a:fld id="{E5B832BA-C66E-4618-9CDA-BB5B0FBA9FBA}" type="datetimeFigureOut">
               <a:rPr lang="en-CA" smtClean="0"/>
-              <a:t>2020-03-26</a:t>
+              <a:t>2020-03-29</a:t>
             </a:fld>
             <a:endParaRPr lang="en-CA"/>
           </a:p>
@@ -3946,7 +3959,7 @@
           <a:p>
             <a:fld id="{E5B832BA-C66E-4618-9CDA-BB5B0FBA9FBA}" type="datetimeFigureOut">
               <a:rPr lang="en-CA" smtClean="0"/>
-              <a:t>2020-03-26</a:t>
+              <a:t>2020-03-29</a:t>
             </a:fld>
             <a:endParaRPr lang="en-CA"/>
           </a:p>
@@ -4041,7 +4054,7 @@
           <a:p>
             <a:fld id="{E5B832BA-C66E-4618-9CDA-BB5B0FBA9FBA}" type="datetimeFigureOut">
               <a:rPr lang="en-CA" smtClean="0"/>
-              <a:t>2020-03-26</a:t>
+              <a:t>2020-03-29</a:t>
             </a:fld>
             <a:endParaRPr lang="en-CA"/>
           </a:p>
@@ -4296,7 +4309,7 @@
           <a:p>
             <a:fld id="{E5B832BA-C66E-4618-9CDA-BB5B0FBA9FBA}" type="datetimeFigureOut">
               <a:rPr lang="en-CA" smtClean="0"/>
-              <a:t>2020-03-26</a:t>
+              <a:t>2020-03-29</a:t>
             </a:fld>
             <a:endParaRPr lang="en-CA"/>
           </a:p>
@@ -4559,7 +4572,7 @@
           <a:p>
             <a:fld id="{E5B832BA-C66E-4618-9CDA-BB5B0FBA9FBA}" type="datetimeFigureOut">
               <a:rPr lang="en-CA" smtClean="0"/>
-              <a:t>2020-03-26</a:t>
+              <a:t>2020-03-29</a:t>
             </a:fld>
             <a:endParaRPr lang="en-CA"/>
           </a:p>
@@ -5302,7 +5315,7 @@
           <a:p>
             <a:fld id="{E5B832BA-C66E-4618-9CDA-BB5B0FBA9FBA}" type="datetimeFigureOut">
               <a:rPr lang="en-CA" smtClean="0"/>
-              <a:t>2020-03-26</a:t>
+              <a:t>2020-03-29</a:t>
             </a:fld>
             <a:endParaRPr lang="en-CA"/>
           </a:p>
@@ -5923,6 +5936,325 @@
 </p:sld>
 </file>
 
+<file path=ppt/slides/slide10.xml><?xml version="1.0" encoding="utf-8"?>
+<p:sld xmlns:a="http://schemas.openxmlformats.org/drawingml/2006/main" xmlns:r="http://schemas.openxmlformats.org/officeDocument/2006/relationships" xmlns:p="http://schemas.openxmlformats.org/presentationml/2006/main">
+  <p:cSld>
+    <p:spTree>
+      <p:nvGrpSpPr>
+        <p:cNvPr id="1" name=""/>
+        <p:cNvGrpSpPr/>
+        <p:nvPr/>
+      </p:nvGrpSpPr>
+      <p:grpSpPr>
+        <a:xfrm>
+          <a:off x="0" y="0"/>
+          <a:ext cx="0" cy="0"/>
+          <a:chOff x="0" y="0"/>
+          <a:chExt cx="0" cy="0"/>
+        </a:xfrm>
+      </p:grpSpPr>
+      <p:sp>
+        <p:nvSpPr>
+          <p:cNvPr id="2" name="Title 1">
+            <a:extLst>
+              <a:ext uri="{FF2B5EF4-FFF2-40B4-BE49-F238E27FC236}">
+                <a16:creationId xmlns:a16="http://schemas.microsoft.com/office/drawing/2014/main" id="{EA589DF6-D5DE-4CF4-8016-035CD759DB88}"/>
+              </a:ext>
+            </a:extLst>
+          </p:cNvPr>
+          <p:cNvSpPr>
+            <a:spLocks noGrp="1"/>
+          </p:cNvSpPr>
+          <p:nvPr>
+            <p:ph type="title"/>
+          </p:nvPr>
+        </p:nvSpPr>
+        <p:spPr>
+          <a:xfrm>
+            <a:off x="677334" y="247887"/>
+            <a:ext cx="9711004" cy="568751"/>
+          </a:xfrm>
+        </p:spPr>
+        <p:txBody>
+          <a:bodyPr>
+            <a:normAutofit fontScale="90000"/>
+          </a:bodyPr>
+          <a:lstStyle/>
+          <a:p>
+            <a:r>
+              <a:rPr lang="en-CA" dirty="0">
+                <a:latin typeface="Tw Cen MT" panose="020B0602020104020603" pitchFamily="34" charset="0"/>
+              </a:rPr>
+              <a:t>DATA EXPLORATION</a:t>
+            </a:r>
+          </a:p>
+        </p:txBody>
+      </p:sp>
+      <p:sp>
+        <p:nvSpPr>
+          <p:cNvPr id="3" name="Content Placeholder 2">
+            <a:extLst>
+              <a:ext uri="{FF2B5EF4-FFF2-40B4-BE49-F238E27FC236}">
+                <a16:creationId xmlns:a16="http://schemas.microsoft.com/office/drawing/2014/main" id="{9864056A-5D51-4C12-9F12-E255804EFC9A}"/>
+              </a:ext>
+            </a:extLst>
+          </p:cNvPr>
+          <p:cNvSpPr>
+            <a:spLocks noGrp="1"/>
+          </p:cNvSpPr>
+          <p:nvPr>
+            <p:ph idx="1"/>
+          </p:nvPr>
+        </p:nvSpPr>
+        <p:spPr>
+          <a:xfrm>
+            <a:off x="386500" y="925047"/>
+            <a:ext cx="8917757" cy="5932953"/>
+          </a:xfrm>
+        </p:spPr>
+        <p:txBody>
+          <a:bodyPr>
+            <a:noAutofit/>
+          </a:bodyPr>
+          <a:lstStyle/>
+          <a:p>
+            <a:r>
+              <a:rPr lang="en-CA" sz="2400" dirty="0">
+                <a:latin typeface="Tw Cen MT" panose="020B0602020104020603" pitchFamily="34" charset="0"/>
+              </a:rPr>
+              <a:t>We also produced a word cloud of the headlines</a:t>
+            </a:r>
+          </a:p>
+          <a:p>
+            <a:pPr marL="0" indent="0">
+              <a:buNone/>
+            </a:pPr>
+            <a:endParaRPr lang="en-CA" sz="2400" dirty="0">
+              <a:latin typeface="Tw Cen MT" panose="020B0602020104020603" pitchFamily="34" charset="0"/>
+            </a:endParaRPr>
+          </a:p>
+          <a:p>
+            <a:pPr marL="0" indent="0">
+              <a:buNone/>
+            </a:pPr>
+            <a:endParaRPr lang="en-CA" sz="2400" dirty="0">
+              <a:latin typeface="Tw Cen MT" panose="020B0602020104020603" pitchFamily="34" charset="0"/>
+            </a:endParaRPr>
+          </a:p>
+          <a:p>
+            <a:pPr marL="0" indent="0">
+              <a:buNone/>
+            </a:pPr>
+            <a:r>
+              <a:rPr lang="en-CA" sz="2200" dirty="0">
+                <a:latin typeface="Tw Cen MT" panose="020B0602020104020603" pitchFamily="34" charset="0"/>
+              </a:rPr>
+              <a:t> </a:t>
+            </a:r>
+          </a:p>
+          <a:p>
+            <a:pPr marL="0" indent="0">
+              <a:buNone/>
+            </a:pPr>
+            <a:endParaRPr lang="en-US" sz="2400" dirty="0">
+              <a:latin typeface="Tw Cen MT" panose="020B0602020104020603" pitchFamily="34" charset="0"/>
+            </a:endParaRPr>
+          </a:p>
+          <a:p>
+            <a:endParaRPr lang="en-US" sz="2400" dirty="0">
+              <a:latin typeface="Tw Cen MT" panose="020B0602020104020603" pitchFamily="34" charset="0"/>
+            </a:endParaRPr>
+          </a:p>
+        </p:txBody>
+      </p:sp>
+      <p:pic>
+        <p:nvPicPr>
+          <p:cNvPr id="8" name="Picture 7">
+            <a:extLst>
+              <a:ext uri="{FF2B5EF4-FFF2-40B4-BE49-F238E27FC236}">
+                <a16:creationId xmlns:a16="http://schemas.microsoft.com/office/drawing/2014/main" id="{62681488-E0F8-48E8-841F-44E221726A38}"/>
+              </a:ext>
+            </a:extLst>
+          </p:cNvPr>
+          <p:cNvPicPr>
+            <a:picLocks noChangeAspect="1"/>
+          </p:cNvPicPr>
+          <p:nvPr/>
+        </p:nvPicPr>
+        <p:blipFill>
+          <a:blip r:embed="rId2">
+            <a:extLst>
+              <a:ext uri="{28A0092B-C50C-407E-A947-70E740481C1C}">
+                <a14:useLocalDpi xmlns:a14="http://schemas.microsoft.com/office/drawing/2010/main" val="0"/>
+              </a:ext>
+            </a:extLst>
+          </a:blip>
+          <a:stretch>
+            <a:fillRect/>
+          </a:stretch>
+        </p:blipFill>
+        <p:spPr>
+          <a:xfrm>
+            <a:off x="1285858" y="1818187"/>
+            <a:ext cx="7119040" cy="3697012"/>
+          </a:xfrm>
+          <a:prstGeom prst="rect">
+            <a:avLst/>
+          </a:prstGeom>
+        </p:spPr>
+      </p:pic>
+    </p:spTree>
+    <p:extLst>
+      <p:ext uri="{BB962C8B-B14F-4D97-AF65-F5344CB8AC3E}">
+        <p14:creationId xmlns:p14="http://schemas.microsoft.com/office/powerpoint/2010/main" val="3015724854"/>
+      </p:ext>
+    </p:extLst>
+  </p:cSld>
+  <p:clrMapOvr>
+    <a:masterClrMapping/>
+  </p:clrMapOvr>
+</p:sld>
+</file>
+
+<file path=ppt/slides/slide11.xml><?xml version="1.0" encoding="utf-8"?>
+<p:sld xmlns:a="http://schemas.openxmlformats.org/drawingml/2006/main" xmlns:r="http://schemas.openxmlformats.org/officeDocument/2006/relationships" xmlns:p="http://schemas.openxmlformats.org/presentationml/2006/main">
+  <p:cSld>
+    <p:spTree>
+      <p:nvGrpSpPr>
+        <p:cNvPr id="1" name=""/>
+        <p:cNvGrpSpPr/>
+        <p:nvPr/>
+      </p:nvGrpSpPr>
+      <p:grpSpPr>
+        <a:xfrm>
+          <a:off x="0" y="0"/>
+          <a:ext cx="0" cy="0"/>
+          <a:chOff x="0" y="0"/>
+          <a:chExt cx="0" cy="0"/>
+        </a:xfrm>
+      </p:grpSpPr>
+      <p:sp>
+        <p:nvSpPr>
+          <p:cNvPr id="3" name="Content Placeholder 2">
+            <a:extLst>
+              <a:ext uri="{FF2B5EF4-FFF2-40B4-BE49-F238E27FC236}">
+                <a16:creationId xmlns:a16="http://schemas.microsoft.com/office/drawing/2014/main" id="{9864056A-5D51-4C12-9F12-E255804EFC9A}"/>
+              </a:ext>
+            </a:extLst>
+          </p:cNvPr>
+          <p:cNvSpPr>
+            <a:spLocks noGrp="1"/>
+          </p:cNvSpPr>
+          <p:nvPr>
+            <p:ph idx="1"/>
+          </p:nvPr>
+        </p:nvSpPr>
+        <p:spPr>
+          <a:xfrm>
+            <a:off x="952109" y="2309567"/>
+            <a:ext cx="8917757" cy="1782713"/>
+          </a:xfrm>
+        </p:spPr>
+        <p:txBody>
+          <a:bodyPr>
+            <a:noAutofit/>
+          </a:bodyPr>
+          <a:lstStyle/>
+          <a:p>
+            <a:pPr marL="0" indent="0" algn="just">
+              <a:buNone/>
+            </a:pPr>
+            <a:r>
+              <a:rPr lang="en-CA" sz="2800" dirty="0">
+                <a:latin typeface="Tw Cen MT" panose="020B0602020104020603" pitchFamily="34" charset="0"/>
+              </a:rPr>
+              <a:t>This marks the initial proposal stage of the project. As we progress, we will iterate through the ML lifecycle and the feature engineering and data exploration steps may accordingly change</a:t>
+            </a:r>
+          </a:p>
+          <a:p>
+            <a:pPr marL="0" indent="0" algn="just">
+              <a:buNone/>
+            </a:pPr>
+            <a:endParaRPr lang="en-CA" sz="2800" dirty="0">
+              <a:latin typeface="Tw Cen MT" panose="020B0602020104020603" pitchFamily="34" charset="0"/>
+            </a:endParaRPr>
+          </a:p>
+          <a:p>
+            <a:pPr marL="0" indent="0" algn="just">
+              <a:buNone/>
+            </a:pPr>
+            <a:endParaRPr lang="en-CA" sz="2800" dirty="0">
+              <a:latin typeface="Tw Cen MT" panose="020B0602020104020603" pitchFamily="34" charset="0"/>
+            </a:endParaRPr>
+          </a:p>
+          <a:p>
+            <a:pPr marL="0" indent="0" algn="just">
+              <a:buNone/>
+            </a:pPr>
+            <a:r>
+              <a:rPr lang="en-CA" sz="2800" dirty="0">
+                <a:latin typeface="Tw Cen MT" panose="020B0602020104020603" pitchFamily="34" charset="0"/>
+              </a:rPr>
+              <a:t> </a:t>
+            </a:r>
+          </a:p>
+          <a:p>
+            <a:pPr marL="0" indent="0" algn="just">
+              <a:buNone/>
+            </a:pPr>
+            <a:endParaRPr lang="en-US" sz="2800" dirty="0">
+              <a:latin typeface="Tw Cen MT" panose="020B0602020104020603" pitchFamily="34" charset="0"/>
+            </a:endParaRPr>
+          </a:p>
+          <a:p>
+            <a:pPr algn="just"/>
+            <a:endParaRPr lang="en-US" sz="2800" dirty="0">
+              <a:latin typeface="Tw Cen MT" panose="020B0602020104020603" pitchFamily="34" charset="0"/>
+            </a:endParaRPr>
+          </a:p>
+        </p:txBody>
+      </p:sp>
+      <p:sp>
+        <p:nvSpPr>
+          <p:cNvPr id="5" name="Title 4">
+            <a:extLst>
+              <a:ext uri="{FF2B5EF4-FFF2-40B4-BE49-F238E27FC236}">
+                <a16:creationId xmlns:a16="http://schemas.microsoft.com/office/drawing/2014/main" id="{6508F712-A4BE-4D53-9969-6568A789666C}"/>
+              </a:ext>
+            </a:extLst>
+          </p:cNvPr>
+          <p:cNvSpPr>
+            <a:spLocks noGrp="1"/>
+          </p:cNvSpPr>
+          <p:nvPr>
+            <p:ph type="title"/>
+          </p:nvPr>
+        </p:nvSpPr>
+        <p:spPr/>
+        <p:txBody>
+          <a:bodyPr/>
+          <a:lstStyle/>
+          <a:p>
+            <a:r>
+              <a:rPr lang="en-CA" dirty="0"/>
+              <a:t> </a:t>
+            </a:r>
+          </a:p>
+        </p:txBody>
+      </p:sp>
+    </p:spTree>
+    <p:extLst>
+      <p:ext uri="{BB962C8B-B14F-4D97-AF65-F5344CB8AC3E}">
+        <p14:creationId xmlns:p14="http://schemas.microsoft.com/office/powerpoint/2010/main" val="111708087"/>
+      </p:ext>
+    </p:extLst>
+  </p:cSld>
+  <p:clrMapOvr>
+    <a:masterClrMapping/>
+  </p:clrMapOvr>
+</p:sld>
+</file>
+
 <file path=ppt/slides/slide2.xml><?xml version="1.0" encoding="utf-8"?>
 <p:sld xmlns:a="http://schemas.openxmlformats.org/drawingml/2006/main" xmlns:r="http://schemas.openxmlformats.org/officeDocument/2006/relationships" xmlns:p="http://schemas.openxmlformats.org/presentationml/2006/main">
   <p:cSld>
@@ -5995,44 +6327,44 @@
         </p:nvSpPr>
         <p:spPr>
           <a:xfrm>
-            <a:off x="677334" y="1046375"/>
-            <a:ext cx="8466666" cy="4994987"/>
+            <a:off x="480767" y="816638"/>
+            <a:ext cx="8917757" cy="5932953"/>
           </a:xfrm>
         </p:spPr>
         <p:txBody>
           <a:bodyPr>
-            <a:normAutofit/>
+            <a:noAutofit/>
           </a:bodyPr>
           <a:lstStyle/>
           <a:p>
             <a:r>
-              <a:rPr lang="en-US" dirty="0">
+              <a:rPr lang="en-US" sz="2000" dirty="0">
                 <a:latin typeface="Tw Cen MT" panose="020B0602020104020603" pitchFamily="34" charset="0"/>
               </a:rPr>
               <a:t>A text classification problem was chosen from the website </a:t>
             </a:r>
             <a:r>
-              <a:rPr lang="en-CA" dirty="0">
+              <a:rPr lang="en-CA" sz="2000" dirty="0">
                 <a:latin typeface="Tw Cen MT" panose="020B0602020104020603" pitchFamily="34" charset="0"/>
                 <a:hlinkClick r:id="rId2"/>
               </a:rPr>
               <a:t>https://datasets.quantumstat.com/</a:t>
             </a:r>
             <a:r>
-              <a:rPr lang="en-CA" dirty="0">
+              <a:rPr lang="en-CA" sz="2000" dirty="0">
                 <a:latin typeface="Tw Cen MT" panose="020B0602020104020603" pitchFamily="34" charset="0"/>
               </a:rPr>
               <a:t>. We chose the AG News corpus dataset</a:t>
             </a:r>
           </a:p>
           <a:p>
-            <a:endParaRPr lang="en-CA" dirty="0">
+            <a:endParaRPr lang="en-CA" sz="2000" dirty="0">
               <a:latin typeface="Tw Cen MT" panose="020B0602020104020603" pitchFamily="34" charset="0"/>
             </a:endParaRPr>
           </a:p>
           <a:p>
             <a:r>
-              <a:rPr lang="en-CA" dirty="0">
+              <a:rPr lang="en-CA" sz="2000" dirty="0">
                 <a:latin typeface="Tw Cen MT" panose="020B0602020104020603" pitchFamily="34" charset="0"/>
               </a:rPr>
               <a:t>The goal of this project is to develop a text classifier model that can accept a news ‘headline’ and ‘content’ of the news to classify the news article into one of the 4 following categories</a:t>
@@ -6041,7 +6373,7 @@
           <a:p>
             <a:pPr lvl="1"/>
             <a:r>
-              <a:rPr lang="en-CA" dirty="0">
+              <a:rPr lang="en-CA" sz="2000" dirty="0">
                 <a:latin typeface="Tw Cen MT" panose="020B0602020104020603" pitchFamily="34" charset="0"/>
               </a:rPr>
               <a:t>World (coded as 1)</a:t>
@@ -6050,7 +6382,7 @@
           <a:p>
             <a:pPr lvl="1"/>
             <a:r>
-              <a:rPr lang="en-CA" dirty="0">
+              <a:rPr lang="en-CA" sz="2000" dirty="0">
                 <a:latin typeface="Tw Cen MT" panose="020B0602020104020603" pitchFamily="34" charset="0"/>
               </a:rPr>
               <a:t>Sports (2)</a:t>
@@ -6059,7 +6391,7 @@
           <a:p>
             <a:pPr lvl="1"/>
             <a:r>
-              <a:rPr lang="en-CA" dirty="0">
+              <a:rPr lang="en-CA" sz="2000" dirty="0">
                 <a:latin typeface="Tw Cen MT" panose="020B0602020104020603" pitchFamily="34" charset="0"/>
               </a:rPr>
               <a:t>Business (3)</a:t>
@@ -6068,30 +6400,22 @@
           <a:p>
             <a:pPr lvl="1"/>
             <a:r>
-              <a:rPr lang="en-CA" dirty="0">
+              <a:rPr lang="en-CA" sz="2000" dirty="0">
                 <a:latin typeface="Tw Cen MT" panose="020B0602020104020603" pitchFamily="34" charset="0"/>
               </a:rPr>
               <a:t>Sci/Tech (4)</a:t>
             </a:r>
           </a:p>
           <a:p>
-            <a:endParaRPr lang="en-CA" dirty="0">
+            <a:endParaRPr lang="en-CA" sz="2000" dirty="0">
               <a:latin typeface="Tw Cen MT" panose="020B0602020104020603" pitchFamily="34" charset="0"/>
             </a:endParaRPr>
           </a:p>
           <a:p>
-            <a:r>
-              <a:rPr lang="en-CA" dirty="0">
-                <a:latin typeface="Tw Cen MT" panose="020B0602020104020603" pitchFamily="34" charset="0"/>
-              </a:rPr>
-              <a:t>The methods that we will use in this project are…</a:t>
-            </a:r>
-            <a:endParaRPr lang="en-US" dirty="0">
-              <a:latin typeface="Tw Cen MT" panose="020B0602020104020603" pitchFamily="34" charset="0"/>
-            </a:endParaRPr>
-          </a:p>
-          <a:p>
-            <a:endParaRPr lang="en-US" dirty="0">
+            <a:pPr marL="0" indent="0">
+              <a:buNone/>
+            </a:pPr>
+            <a:endParaRPr lang="en-US" sz="2000" dirty="0">
               <a:latin typeface="Tw Cen MT" panose="020B0602020104020603" pitchFamily="34" charset="0"/>
             </a:endParaRPr>
           </a:p>
@@ -6269,6 +6593,1778 @@
     <p:extLst>
       <p:ext uri="{BB962C8B-B14F-4D97-AF65-F5344CB8AC3E}">
         <p14:creationId xmlns:p14="http://schemas.microsoft.com/office/powerpoint/2010/main" val="1895010594"/>
+      </p:ext>
+    </p:extLst>
+  </p:cSld>
+  <p:clrMapOvr>
+    <a:masterClrMapping/>
+  </p:clrMapOvr>
+</p:sld>
+</file>
+
+<file path=ppt/slides/slide4.xml><?xml version="1.0" encoding="utf-8"?>
+<p:sld xmlns:a="http://schemas.openxmlformats.org/drawingml/2006/main" xmlns:r="http://schemas.openxmlformats.org/officeDocument/2006/relationships" xmlns:p="http://schemas.openxmlformats.org/presentationml/2006/main">
+  <p:cSld>
+    <p:spTree>
+      <p:nvGrpSpPr>
+        <p:cNvPr id="1" name=""/>
+        <p:cNvGrpSpPr/>
+        <p:nvPr/>
+      </p:nvGrpSpPr>
+      <p:grpSpPr>
+        <a:xfrm>
+          <a:off x="0" y="0"/>
+          <a:ext cx="0" cy="0"/>
+          <a:chOff x="0" y="0"/>
+          <a:chExt cx="0" cy="0"/>
+        </a:xfrm>
+      </p:grpSpPr>
+      <p:sp>
+        <p:nvSpPr>
+          <p:cNvPr id="2" name="Title 1">
+            <a:extLst>
+              <a:ext uri="{FF2B5EF4-FFF2-40B4-BE49-F238E27FC236}">
+                <a16:creationId xmlns:a16="http://schemas.microsoft.com/office/drawing/2014/main" id="{EA589DF6-D5DE-4CF4-8016-035CD759DB88}"/>
+              </a:ext>
+            </a:extLst>
+          </p:cNvPr>
+          <p:cNvSpPr>
+            <a:spLocks noGrp="1"/>
+          </p:cNvSpPr>
+          <p:nvPr>
+            <p:ph type="title"/>
+          </p:nvPr>
+        </p:nvSpPr>
+        <p:spPr>
+          <a:xfrm>
+            <a:off x="677334" y="247887"/>
+            <a:ext cx="9711004" cy="568751"/>
+          </a:xfrm>
+        </p:spPr>
+        <p:txBody>
+          <a:bodyPr>
+            <a:normAutofit fontScale="90000"/>
+          </a:bodyPr>
+          <a:lstStyle/>
+          <a:p>
+            <a:r>
+              <a:rPr lang="en-CA" dirty="0">
+                <a:latin typeface="Tw Cen MT" panose="020B0602020104020603" pitchFamily="34" charset="0"/>
+              </a:rPr>
+              <a:t>FEATURE ENGINEERING &amp; MODELS - PLAN</a:t>
+            </a:r>
+          </a:p>
+        </p:txBody>
+      </p:sp>
+      <p:sp>
+        <p:nvSpPr>
+          <p:cNvPr id="3" name="Content Placeholder 2">
+            <a:extLst>
+              <a:ext uri="{FF2B5EF4-FFF2-40B4-BE49-F238E27FC236}">
+                <a16:creationId xmlns:a16="http://schemas.microsoft.com/office/drawing/2014/main" id="{9864056A-5D51-4C12-9F12-E255804EFC9A}"/>
+              </a:ext>
+            </a:extLst>
+          </p:cNvPr>
+          <p:cNvSpPr>
+            <a:spLocks noGrp="1"/>
+          </p:cNvSpPr>
+          <p:nvPr>
+            <p:ph idx="1"/>
+          </p:nvPr>
+        </p:nvSpPr>
+        <p:spPr>
+          <a:xfrm>
+            <a:off x="480767" y="816638"/>
+            <a:ext cx="8917757" cy="5932953"/>
+          </a:xfrm>
+        </p:spPr>
+        <p:txBody>
+          <a:bodyPr>
+            <a:noAutofit/>
+          </a:bodyPr>
+          <a:lstStyle/>
+          <a:p>
+            <a:r>
+              <a:rPr lang="en-CA" sz="2400" dirty="0">
+                <a:latin typeface="Tw Cen MT" panose="020B0602020104020603" pitchFamily="34" charset="0"/>
+              </a:rPr>
+              <a:t>We will perform feature engineering using the following methods</a:t>
+            </a:r>
+          </a:p>
+          <a:p>
+            <a:pPr lvl="1"/>
+            <a:r>
+              <a:rPr lang="en-CA" sz="2400" dirty="0">
+                <a:latin typeface="Tw Cen MT" panose="020B0602020104020603" pitchFamily="34" charset="0"/>
+              </a:rPr>
+              <a:t>Bag of words</a:t>
+            </a:r>
+          </a:p>
+          <a:p>
+            <a:pPr lvl="1"/>
+            <a:r>
+              <a:rPr lang="en-CA" sz="2400" dirty="0">
+                <a:latin typeface="Tw Cen MT" panose="020B0602020104020603" pitchFamily="34" charset="0"/>
+              </a:rPr>
+              <a:t>Bag of n-grams</a:t>
+            </a:r>
+          </a:p>
+          <a:p>
+            <a:pPr lvl="1"/>
+            <a:r>
+              <a:rPr lang="en-CA" sz="2400" dirty="0" err="1">
+                <a:latin typeface="Tw Cen MT" panose="020B0602020104020603" pitchFamily="34" charset="0"/>
+              </a:rPr>
+              <a:t>Tfidf</a:t>
+            </a:r>
+            <a:endParaRPr lang="en-CA" sz="2400" dirty="0">
+              <a:latin typeface="Tw Cen MT" panose="020B0602020104020603" pitchFamily="34" charset="0"/>
+            </a:endParaRPr>
+          </a:p>
+          <a:p>
+            <a:pPr lvl="1"/>
+            <a:r>
+              <a:rPr lang="en-CA" sz="2400" dirty="0">
+                <a:latin typeface="Tw Cen MT" panose="020B0602020104020603" pitchFamily="34" charset="0"/>
+              </a:rPr>
+              <a:t>Glove</a:t>
+            </a:r>
+          </a:p>
+          <a:p>
+            <a:endParaRPr lang="en-CA" sz="2400" dirty="0">
+              <a:latin typeface="Tw Cen MT" panose="020B0602020104020603" pitchFamily="34" charset="0"/>
+            </a:endParaRPr>
+          </a:p>
+          <a:p>
+            <a:r>
+              <a:rPr lang="en-CA" sz="2400" dirty="0">
+                <a:latin typeface="Tw Cen MT" panose="020B0602020104020603" pitchFamily="34" charset="0"/>
+              </a:rPr>
+              <a:t>We will use the following models to perform classification</a:t>
+            </a:r>
+          </a:p>
+          <a:p>
+            <a:pPr lvl="1"/>
+            <a:r>
+              <a:rPr lang="en-CA" sz="2400" dirty="0">
+                <a:latin typeface="Tw Cen MT" panose="020B0602020104020603" pitchFamily="34" charset="0"/>
+              </a:rPr>
+              <a:t>Logistic regression</a:t>
+            </a:r>
+          </a:p>
+          <a:p>
+            <a:pPr lvl="1"/>
+            <a:r>
+              <a:rPr lang="en-CA" sz="2400" dirty="0">
+                <a:latin typeface="Tw Cen MT" panose="020B0602020104020603" pitchFamily="34" charset="0"/>
+              </a:rPr>
+              <a:t>Decision trees</a:t>
+            </a:r>
+          </a:p>
+          <a:p>
+            <a:pPr lvl="1"/>
+            <a:r>
+              <a:rPr lang="en-CA" sz="2400" dirty="0">
+                <a:latin typeface="Tw Cen MT" panose="020B0602020104020603" pitchFamily="34" charset="0"/>
+              </a:rPr>
+              <a:t>SVM</a:t>
+            </a:r>
+          </a:p>
+          <a:p>
+            <a:pPr lvl="1"/>
+            <a:r>
+              <a:rPr lang="en-CA" sz="2400" dirty="0">
+                <a:latin typeface="Tw Cen MT" panose="020B0602020104020603" pitchFamily="34" charset="0"/>
+              </a:rPr>
+              <a:t>Naive Bayes</a:t>
+            </a:r>
+          </a:p>
+          <a:p>
+            <a:pPr marL="0" indent="0">
+              <a:buNone/>
+            </a:pPr>
+            <a:endParaRPr lang="en-US" sz="2400" dirty="0">
+              <a:latin typeface="Tw Cen MT" panose="020B0602020104020603" pitchFamily="34" charset="0"/>
+            </a:endParaRPr>
+          </a:p>
+          <a:p>
+            <a:endParaRPr lang="en-US" sz="2400" dirty="0">
+              <a:latin typeface="Tw Cen MT" panose="020B0602020104020603" pitchFamily="34" charset="0"/>
+            </a:endParaRPr>
+          </a:p>
+        </p:txBody>
+      </p:sp>
+    </p:spTree>
+    <p:extLst>
+      <p:ext uri="{BB962C8B-B14F-4D97-AF65-F5344CB8AC3E}">
+        <p14:creationId xmlns:p14="http://schemas.microsoft.com/office/powerpoint/2010/main" val="385891812"/>
+      </p:ext>
+    </p:extLst>
+  </p:cSld>
+  <p:clrMapOvr>
+    <a:masterClrMapping/>
+  </p:clrMapOvr>
+</p:sld>
+</file>
+
+<file path=ppt/slides/slide5.xml><?xml version="1.0" encoding="utf-8"?>
+<p:sld xmlns:a="http://schemas.openxmlformats.org/drawingml/2006/main" xmlns:r="http://schemas.openxmlformats.org/officeDocument/2006/relationships" xmlns:p="http://schemas.openxmlformats.org/presentationml/2006/main">
+  <p:cSld>
+    <p:spTree>
+      <p:nvGrpSpPr>
+        <p:cNvPr id="1" name=""/>
+        <p:cNvGrpSpPr/>
+        <p:nvPr/>
+      </p:nvGrpSpPr>
+      <p:grpSpPr>
+        <a:xfrm>
+          <a:off x="0" y="0"/>
+          <a:ext cx="0" cy="0"/>
+          <a:chOff x="0" y="0"/>
+          <a:chExt cx="0" cy="0"/>
+        </a:xfrm>
+      </p:grpSpPr>
+      <p:sp>
+        <p:nvSpPr>
+          <p:cNvPr id="2" name="Title 1">
+            <a:extLst>
+              <a:ext uri="{FF2B5EF4-FFF2-40B4-BE49-F238E27FC236}">
+                <a16:creationId xmlns:a16="http://schemas.microsoft.com/office/drawing/2014/main" id="{EA589DF6-D5DE-4CF4-8016-035CD759DB88}"/>
+              </a:ext>
+            </a:extLst>
+          </p:cNvPr>
+          <p:cNvSpPr>
+            <a:spLocks noGrp="1"/>
+          </p:cNvSpPr>
+          <p:nvPr>
+            <p:ph type="title"/>
+          </p:nvPr>
+        </p:nvSpPr>
+        <p:spPr>
+          <a:xfrm>
+            <a:off x="677334" y="247887"/>
+            <a:ext cx="9711004" cy="568751"/>
+          </a:xfrm>
+        </p:spPr>
+        <p:txBody>
+          <a:bodyPr>
+            <a:normAutofit fontScale="90000"/>
+          </a:bodyPr>
+          <a:lstStyle/>
+          <a:p>
+            <a:r>
+              <a:rPr lang="en-CA" dirty="0">
+                <a:latin typeface="Tw Cen MT" panose="020B0602020104020603" pitchFamily="34" charset="0"/>
+              </a:rPr>
+              <a:t>DATA CLEANING </a:t>
+            </a:r>
+          </a:p>
+        </p:txBody>
+      </p:sp>
+      <p:sp>
+        <p:nvSpPr>
+          <p:cNvPr id="3" name="Content Placeholder 2">
+            <a:extLst>
+              <a:ext uri="{FF2B5EF4-FFF2-40B4-BE49-F238E27FC236}">
+                <a16:creationId xmlns:a16="http://schemas.microsoft.com/office/drawing/2014/main" id="{9864056A-5D51-4C12-9F12-E255804EFC9A}"/>
+              </a:ext>
+            </a:extLst>
+          </p:cNvPr>
+          <p:cNvSpPr>
+            <a:spLocks noGrp="1"/>
+          </p:cNvSpPr>
+          <p:nvPr>
+            <p:ph idx="1"/>
+          </p:nvPr>
+        </p:nvSpPr>
+        <p:spPr>
+          <a:xfrm>
+            <a:off x="452487" y="1090015"/>
+            <a:ext cx="8917757" cy="5932953"/>
+          </a:xfrm>
+        </p:spPr>
+        <p:txBody>
+          <a:bodyPr>
+            <a:noAutofit/>
+          </a:bodyPr>
+          <a:lstStyle/>
+          <a:p>
+            <a:r>
+              <a:rPr lang="en-CA" sz="2400" dirty="0">
+                <a:latin typeface="Tw Cen MT" panose="020B0602020104020603" pitchFamily="34" charset="0"/>
+              </a:rPr>
+              <a:t>The raw data was explored to identify whether it required balancing. It was found that there were equal number of ‘headlines’ and ‘content’ for each category. (Each category has 30,000)</a:t>
+            </a:r>
+          </a:p>
+          <a:p>
+            <a:r>
+              <a:rPr lang="en-CA" sz="2400" dirty="0">
+                <a:latin typeface="Tw Cen MT" panose="020B0602020104020603" pitchFamily="34" charset="0"/>
+              </a:rPr>
+              <a:t>We started with a sample of 1000 rows from the raw data. The sample data was pretty balanced as well</a:t>
+            </a:r>
+          </a:p>
+          <a:p>
+            <a:pPr marL="0" indent="0">
+              <a:buNone/>
+            </a:pPr>
+            <a:r>
+              <a:rPr lang="en-CA" sz="2200" dirty="0">
+                <a:latin typeface="Tw Cen MT" panose="020B0602020104020603" pitchFamily="34" charset="0"/>
+              </a:rPr>
+              <a:t> </a:t>
+            </a:r>
+          </a:p>
+          <a:p>
+            <a:pPr marL="0" indent="0">
+              <a:buNone/>
+            </a:pPr>
+            <a:endParaRPr lang="en-US" sz="2400" dirty="0">
+              <a:latin typeface="Tw Cen MT" panose="020B0602020104020603" pitchFamily="34" charset="0"/>
+            </a:endParaRPr>
+          </a:p>
+          <a:p>
+            <a:endParaRPr lang="en-US" sz="2400" dirty="0">
+              <a:latin typeface="Tw Cen MT" panose="020B0602020104020603" pitchFamily="34" charset="0"/>
+            </a:endParaRPr>
+          </a:p>
+        </p:txBody>
+      </p:sp>
+      <p:pic>
+        <p:nvPicPr>
+          <p:cNvPr id="9" name="Picture 8">
+            <a:extLst>
+              <a:ext uri="{FF2B5EF4-FFF2-40B4-BE49-F238E27FC236}">
+                <a16:creationId xmlns:a16="http://schemas.microsoft.com/office/drawing/2014/main" id="{E1278AE0-A10B-49FB-BFBE-1D57582AAFD8}"/>
+              </a:ext>
+            </a:extLst>
+          </p:cNvPr>
+          <p:cNvPicPr>
+            <a:picLocks noChangeAspect="1"/>
+          </p:cNvPicPr>
+          <p:nvPr/>
+        </p:nvPicPr>
+        <p:blipFill>
+          <a:blip r:embed="rId2">
+            <a:extLst>
+              <a:ext uri="{28A0092B-C50C-407E-A947-70E740481C1C}">
+                <a14:useLocalDpi xmlns:a14="http://schemas.microsoft.com/office/drawing/2010/main" val="0"/>
+              </a:ext>
+            </a:extLst>
+          </a:blip>
+          <a:stretch>
+            <a:fillRect/>
+          </a:stretch>
+        </p:blipFill>
+        <p:spPr>
+          <a:xfrm>
+            <a:off x="240138" y="3429000"/>
+            <a:ext cx="4413288" cy="3115764"/>
+          </a:xfrm>
+          <a:prstGeom prst="rect">
+            <a:avLst/>
+          </a:prstGeom>
+        </p:spPr>
+      </p:pic>
+      <p:pic>
+        <p:nvPicPr>
+          <p:cNvPr id="11" name="Picture 10">
+            <a:extLst>
+              <a:ext uri="{FF2B5EF4-FFF2-40B4-BE49-F238E27FC236}">
+                <a16:creationId xmlns:a16="http://schemas.microsoft.com/office/drawing/2014/main" id="{AE2F865B-2530-4405-A4C9-BC552781684B}"/>
+              </a:ext>
+            </a:extLst>
+          </p:cNvPr>
+          <p:cNvPicPr>
+            <a:picLocks noChangeAspect="1"/>
+          </p:cNvPicPr>
+          <p:nvPr/>
+        </p:nvPicPr>
+        <p:blipFill>
+          <a:blip r:embed="rId3">
+            <a:extLst>
+              <a:ext uri="{28A0092B-C50C-407E-A947-70E740481C1C}">
+                <a14:useLocalDpi xmlns:a14="http://schemas.microsoft.com/office/drawing/2010/main" val="0"/>
+              </a:ext>
+            </a:extLst>
+          </a:blip>
+          <a:stretch>
+            <a:fillRect/>
+          </a:stretch>
+        </p:blipFill>
+        <p:spPr>
+          <a:xfrm>
+            <a:off x="5026659" y="3429000"/>
+            <a:ext cx="4268170" cy="3115764"/>
+          </a:xfrm>
+          <a:prstGeom prst="rect">
+            <a:avLst/>
+          </a:prstGeom>
+        </p:spPr>
+      </p:pic>
+    </p:spTree>
+    <p:extLst>
+      <p:ext uri="{BB962C8B-B14F-4D97-AF65-F5344CB8AC3E}">
+        <p14:creationId xmlns:p14="http://schemas.microsoft.com/office/powerpoint/2010/main" val="2452044605"/>
+      </p:ext>
+    </p:extLst>
+  </p:cSld>
+  <p:clrMapOvr>
+    <a:masterClrMapping/>
+  </p:clrMapOvr>
+</p:sld>
+</file>
+
+<file path=ppt/slides/slide6.xml><?xml version="1.0" encoding="utf-8"?>
+<p:sld xmlns:a="http://schemas.openxmlformats.org/drawingml/2006/main" xmlns:r="http://schemas.openxmlformats.org/officeDocument/2006/relationships" xmlns:p="http://schemas.openxmlformats.org/presentationml/2006/main">
+  <p:cSld>
+    <p:spTree>
+      <p:nvGrpSpPr>
+        <p:cNvPr id="1" name=""/>
+        <p:cNvGrpSpPr/>
+        <p:nvPr/>
+      </p:nvGrpSpPr>
+      <p:grpSpPr>
+        <a:xfrm>
+          <a:off x="0" y="0"/>
+          <a:ext cx="0" cy="0"/>
+          <a:chOff x="0" y="0"/>
+          <a:chExt cx="0" cy="0"/>
+        </a:xfrm>
+      </p:grpSpPr>
+      <p:sp>
+        <p:nvSpPr>
+          <p:cNvPr id="2" name="Title 1">
+            <a:extLst>
+              <a:ext uri="{FF2B5EF4-FFF2-40B4-BE49-F238E27FC236}">
+                <a16:creationId xmlns:a16="http://schemas.microsoft.com/office/drawing/2014/main" id="{EA589DF6-D5DE-4CF4-8016-035CD759DB88}"/>
+              </a:ext>
+            </a:extLst>
+          </p:cNvPr>
+          <p:cNvSpPr>
+            <a:spLocks noGrp="1"/>
+          </p:cNvSpPr>
+          <p:nvPr>
+            <p:ph type="title"/>
+          </p:nvPr>
+        </p:nvSpPr>
+        <p:spPr>
+          <a:xfrm>
+            <a:off x="677334" y="247887"/>
+            <a:ext cx="9711004" cy="568751"/>
+          </a:xfrm>
+        </p:spPr>
+        <p:txBody>
+          <a:bodyPr>
+            <a:normAutofit fontScale="90000"/>
+          </a:bodyPr>
+          <a:lstStyle/>
+          <a:p>
+            <a:r>
+              <a:rPr lang="en-CA" dirty="0">
+                <a:latin typeface="Tw Cen MT" panose="020B0602020104020603" pitchFamily="34" charset="0"/>
+              </a:rPr>
+              <a:t>DATA CLEANING </a:t>
+            </a:r>
+          </a:p>
+        </p:txBody>
+      </p:sp>
+      <p:sp>
+        <p:nvSpPr>
+          <p:cNvPr id="3" name="Content Placeholder 2">
+            <a:extLst>
+              <a:ext uri="{FF2B5EF4-FFF2-40B4-BE49-F238E27FC236}">
+                <a16:creationId xmlns:a16="http://schemas.microsoft.com/office/drawing/2014/main" id="{9864056A-5D51-4C12-9F12-E255804EFC9A}"/>
+              </a:ext>
+            </a:extLst>
+          </p:cNvPr>
+          <p:cNvSpPr>
+            <a:spLocks noGrp="1"/>
+          </p:cNvSpPr>
+          <p:nvPr>
+            <p:ph idx="1"/>
+          </p:nvPr>
+        </p:nvSpPr>
+        <p:spPr>
+          <a:xfrm>
+            <a:off x="386500" y="925047"/>
+            <a:ext cx="8917757" cy="5932953"/>
+          </a:xfrm>
+        </p:spPr>
+        <p:txBody>
+          <a:bodyPr>
+            <a:noAutofit/>
+          </a:bodyPr>
+          <a:lstStyle/>
+          <a:p>
+            <a:r>
+              <a:rPr lang="en-CA" sz="2400" dirty="0">
+                <a:latin typeface="Tw Cen MT" panose="020B0602020104020603" pitchFamily="34" charset="0"/>
+              </a:rPr>
+              <a:t>Header: The raw data did not contain headers for the columns. The columns were appropriately named</a:t>
+            </a:r>
+          </a:p>
+          <a:p>
+            <a:endParaRPr lang="en-CA" sz="2400" dirty="0">
+              <a:latin typeface="Tw Cen MT" panose="020B0602020104020603" pitchFamily="34" charset="0"/>
+            </a:endParaRPr>
+          </a:p>
+          <a:p>
+            <a:r>
+              <a:rPr lang="en-CA" sz="2400" dirty="0">
+                <a:latin typeface="Tw Cen MT" panose="020B0602020104020603" pitchFamily="34" charset="0"/>
+              </a:rPr>
+              <a:t>HTML Code: There were some HTML code found in the raw data, like “&amp;</a:t>
+            </a:r>
+            <a:r>
+              <a:rPr lang="en-CA" sz="2400" dirty="0" err="1">
+                <a:latin typeface="Tw Cen MT" panose="020B0602020104020603" pitchFamily="34" charset="0"/>
+              </a:rPr>
+              <a:t>gt</a:t>
+            </a:r>
+            <a:r>
+              <a:rPr lang="en-CA" sz="2400" dirty="0">
+                <a:latin typeface="Tw Cen MT" panose="020B0602020104020603" pitchFamily="34" charset="0"/>
+              </a:rPr>
+              <a:t>” and “&amp;</a:t>
+            </a:r>
+            <a:r>
+              <a:rPr lang="en-CA" sz="2400" dirty="0" err="1">
+                <a:latin typeface="Tw Cen MT" panose="020B0602020104020603" pitchFamily="34" charset="0"/>
+              </a:rPr>
+              <a:t>lt</a:t>
+            </a:r>
+            <a:r>
+              <a:rPr lang="en-CA" sz="2400" dirty="0">
+                <a:latin typeface="Tw Cen MT" panose="020B0602020104020603" pitchFamily="34" charset="0"/>
+              </a:rPr>
+              <a:t>” and were removed</a:t>
+            </a:r>
+          </a:p>
+          <a:p>
+            <a:r>
+              <a:rPr lang="en-CA" sz="2400" dirty="0">
+                <a:latin typeface="Tw Cen MT" panose="020B0602020104020603" pitchFamily="34" charset="0"/>
+              </a:rPr>
+              <a:t>News Sources: Some of the rows in the ‘headline’ column contained the news source like (Reuters), (AP) etc. These were removed as they don’t contribute much to the overall classification problem</a:t>
+            </a:r>
+          </a:p>
+          <a:p>
+            <a:pPr marL="0" indent="0">
+              <a:buNone/>
+            </a:pPr>
+            <a:endParaRPr lang="en-CA" sz="2400" dirty="0">
+              <a:latin typeface="Tw Cen MT" panose="020B0602020104020603" pitchFamily="34" charset="0"/>
+            </a:endParaRPr>
+          </a:p>
+          <a:p>
+            <a:pPr marL="0" indent="0">
+              <a:buNone/>
+            </a:pPr>
+            <a:endParaRPr lang="en-CA" sz="2400" dirty="0">
+              <a:latin typeface="Tw Cen MT" panose="020B0602020104020603" pitchFamily="34" charset="0"/>
+            </a:endParaRPr>
+          </a:p>
+          <a:p>
+            <a:pPr marL="0" indent="0">
+              <a:buNone/>
+            </a:pPr>
+            <a:r>
+              <a:rPr lang="en-CA" sz="2200" dirty="0">
+                <a:latin typeface="Tw Cen MT" panose="020B0602020104020603" pitchFamily="34" charset="0"/>
+              </a:rPr>
+              <a:t> </a:t>
+            </a:r>
+          </a:p>
+          <a:p>
+            <a:pPr marL="0" indent="0">
+              <a:buNone/>
+            </a:pPr>
+            <a:endParaRPr lang="en-US" sz="2400" dirty="0">
+              <a:latin typeface="Tw Cen MT" panose="020B0602020104020603" pitchFamily="34" charset="0"/>
+            </a:endParaRPr>
+          </a:p>
+          <a:p>
+            <a:endParaRPr lang="en-US" sz="2400" dirty="0">
+              <a:latin typeface="Tw Cen MT" panose="020B0602020104020603" pitchFamily="34" charset="0"/>
+            </a:endParaRPr>
+          </a:p>
+        </p:txBody>
+      </p:sp>
+      <p:sp>
+        <p:nvSpPr>
+          <p:cNvPr id="4" name="TextBox 3">
+            <a:extLst>
+              <a:ext uri="{FF2B5EF4-FFF2-40B4-BE49-F238E27FC236}">
+                <a16:creationId xmlns:a16="http://schemas.microsoft.com/office/drawing/2014/main" id="{425206EC-0BFB-49C9-98F1-C29293C615E1}"/>
+              </a:ext>
+            </a:extLst>
+          </p:cNvPr>
+          <p:cNvSpPr txBox="1"/>
+          <p:nvPr/>
+        </p:nvSpPr>
+        <p:spPr>
+          <a:xfrm>
+            <a:off x="677334" y="1817547"/>
+            <a:ext cx="7401438" cy="369332"/>
+          </a:xfrm>
+          <a:prstGeom prst="rect">
+            <a:avLst/>
+          </a:prstGeom>
+          <a:noFill/>
+          <a:ln>
+            <a:solidFill>
+              <a:schemeClr val="accent1">
+                <a:lumMod val="60000"/>
+                <a:lumOff val="40000"/>
+              </a:schemeClr>
+            </a:solidFill>
+          </a:ln>
+        </p:spPr>
+        <p:txBody>
+          <a:bodyPr wrap="square" rtlCol="0">
+            <a:spAutoFit/>
+          </a:bodyPr>
+          <a:lstStyle/>
+          <a:p>
+            <a:r>
+              <a:rPr lang="en-CA" b="1" dirty="0" err="1">
+                <a:latin typeface="Tw Cen MT" panose="020B0602020104020603" pitchFamily="34" charset="0"/>
+              </a:rPr>
+              <a:t>train_data.columns</a:t>
+            </a:r>
+            <a:r>
+              <a:rPr lang="en-CA" b="1" dirty="0">
+                <a:latin typeface="Tw Cen MT" panose="020B0602020104020603" pitchFamily="34" charset="0"/>
+              </a:rPr>
+              <a:t> = ['category', 'headline', 'content']</a:t>
+            </a:r>
+          </a:p>
+        </p:txBody>
+      </p:sp>
+      <p:sp>
+        <p:nvSpPr>
+          <p:cNvPr id="7" name="TextBox 6">
+            <a:extLst>
+              <a:ext uri="{FF2B5EF4-FFF2-40B4-BE49-F238E27FC236}">
+                <a16:creationId xmlns:a16="http://schemas.microsoft.com/office/drawing/2014/main" id="{664F35AA-8660-487C-96B5-747C427011A1}"/>
+              </a:ext>
+            </a:extLst>
+          </p:cNvPr>
+          <p:cNvSpPr txBox="1"/>
+          <p:nvPr/>
+        </p:nvSpPr>
+        <p:spPr>
+          <a:xfrm>
+            <a:off x="677334" y="4535276"/>
+            <a:ext cx="8560934" cy="1754326"/>
+          </a:xfrm>
+          <a:prstGeom prst="rect">
+            <a:avLst/>
+          </a:prstGeom>
+          <a:noFill/>
+          <a:ln>
+            <a:solidFill>
+              <a:schemeClr val="accent1">
+                <a:lumMod val="60000"/>
+                <a:lumOff val="40000"/>
+              </a:schemeClr>
+            </a:solidFill>
+          </a:ln>
+        </p:spPr>
+        <p:txBody>
+          <a:bodyPr wrap="square" rtlCol="0">
+            <a:spAutoFit/>
+          </a:bodyPr>
+          <a:lstStyle/>
+          <a:p>
+            <a:r>
+              <a:rPr lang="en-CA" b="1" dirty="0">
+                <a:latin typeface="Tw Cen MT" panose="020B0602020104020603" pitchFamily="34" charset="0"/>
+              </a:rPr>
+              <a:t>import re</a:t>
+            </a:r>
+          </a:p>
+          <a:p>
+            <a:r>
+              <a:rPr lang="en-CA" b="1" dirty="0">
+                <a:latin typeface="Tw Cen MT" panose="020B0602020104020603" pitchFamily="34" charset="0"/>
+              </a:rPr>
+              <a:t>def clean(x):</a:t>
+            </a:r>
+          </a:p>
+          <a:p>
+            <a:r>
+              <a:rPr lang="en-CA" b="1" dirty="0">
+                <a:latin typeface="Tw Cen MT" panose="020B0602020104020603" pitchFamily="34" charset="0"/>
+              </a:rPr>
+              <a:t>    x = </a:t>
+            </a:r>
+            <a:r>
+              <a:rPr lang="en-CA" b="1" dirty="0" err="1">
+                <a:latin typeface="Tw Cen MT" panose="020B0602020104020603" pitchFamily="34" charset="0"/>
+              </a:rPr>
+              <a:t>re.sub</a:t>
+            </a:r>
+            <a:r>
+              <a:rPr lang="en-CA" b="1" dirty="0">
+                <a:latin typeface="Tw Cen MT" panose="020B0602020104020603" pitchFamily="34" charset="0"/>
+              </a:rPr>
+              <a:t>(r'(&amp;[A-Za-z]+)|\(.*\)', '', x)</a:t>
+            </a:r>
+          </a:p>
+          <a:p>
+            <a:r>
+              <a:rPr lang="en-CA" b="1" dirty="0">
+                <a:latin typeface="Tw Cen MT" panose="020B0602020104020603" pitchFamily="34" charset="0"/>
+              </a:rPr>
+              <a:t>    return str(x)</a:t>
+            </a:r>
+          </a:p>
+          <a:p>
+            <a:r>
+              <a:rPr lang="en-CA" b="1" dirty="0">
+                <a:latin typeface="Tw Cen MT" panose="020B0602020104020603" pitchFamily="34" charset="0"/>
+              </a:rPr>
+              <a:t>for </a:t>
+            </a:r>
+            <a:r>
+              <a:rPr lang="en-CA" b="1" dirty="0" err="1">
+                <a:latin typeface="Tw Cen MT" panose="020B0602020104020603" pitchFamily="34" charset="0"/>
+              </a:rPr>
+              <a:t>i</a:t>
+            </a:r>
+            <a:r>
+              <a:rPr lang="en-CA" b="1" dirty="0">
+                <a:latin typeface="Tw Cen MT" panose="020B0602020104020603" pitchFamily="34" charset="0"/>
+              </a:rPr>
+              <a:t>, row in </a:t>
+            </a:r>
+            <a:r>
+              <a:rPr lang="en-CA" b="1" dirty="0" err="1">
+                <a:latin typeface="Tw Cen MT" panose="020B0602020104020603" pitchFamily="34" charset="0"/>
+              </a:rPr>
+              <a:t>train_data_sample.iterrows</a:t>
+            </a:r>
+            <a:r>
+              <a:rPr lang="en-CA" b="1" dirty="0">
+                <a:latin typeface="Tw Cen MT" panose="020B0602020104020603" pitchFamily="34" charset="0"/>
+              </a:rPr>
+              <a:t>():</a:t>
+            </a:r>
+          </a:p>
+          <a:p>
+            <a:r>
+              <a:rPr lang="en-CA" b="1" dirty="0">
+                <a:latin typeface="Tw Cen MT" panose="020B0602020104020603" pitchFamily="34" charset="0"/>
+              </a:rPr>
+              <a:t>    train_data_sample.at[</a:t>
+            </a:r>
+            <a:r>
+              <a:rPr lang="en-CA" b="1" dirty="0" err="1">
+                <a:latin typeface="Tw Cen MT" panose="020B0602020104020603" pitchFamily="34" charset="0"/>
+              </a:rPr>
+              <a:t>i</a:t>
+            </a:r>
+            <a:r>
+              <a:rPr lang="en-CA" b="1" dirty="0">
+                <a:latin typeface="Tw Cen MT" panose="020B0602020104020603" pitchFamily="34" charset="0"/>
+              </a:rPr>
+              <a:t>, "headline"] = clean(</a:t>
+            </a:r>
+            <a:r>
+              <a:rPr lang="en-CA" b="1" dirty="0" err="1">
+                <a:latin typeface="Tw Cen MT" panose="020B0602020104020603" pitchFamily="34" charset="0"/>
+              </a:rPr>
+              <a:t>row.headline</a:t>
+            </a:r>
+            <a:r>
+              <a:rPr lang="en-CA" b="1" dirty="0">
+                <a:latin typeface="Tw Cen MT" panose="020B0602020104020603" pitchFamily="34" charset="0"/>
+              </a:rPr>
+              <a:t>)</a:t>
+            </a:r>
+          </a:p>
+        </p:txBody>
+      </p:sp>
+    </p:spTree>
+    <p:extLst>
+      <p:ext uri="{BB962C8B-B14F-4D97-AF65-F5344CB8AC3E}">
+        <p14:creationId xmlns:p14="http://schemas.microsoft.com/office/powerpoint/2010/main" val="3243784491"/>
+      </p:ext>
+    </p:extLst>
+  </p:cSld>
+  <p:clrMapOvr>
+    <a:masterClrMapping/>
+  </p:clrMapOvr>
+</p:sld>
+</file>
+
+<file path=ppt/slides/slide7.xml><?xml version="1.0" encoding="utf-8"?>
+<p:sld xmlns:a="http://schemas.openxmlformats.org/drawingml/2006/main" xmlns:r="http://schemas.openxmlformats.org/officeDocument/2006/relationships" xmlns:p="http://schemas.openxmlformats.org/presentationml/2006/main">
+  <p:cSld>
+    <p:spTree>
+      <p:nvGrpSpPr>
+        <p:cNvPr id="1" name=""/>
+        <p:cNvGrpSpPr/>
+        <p:nvPr/>
+      </p:nvGrpSpPr>
+      <p:grpSpPr>
+        <a:xfrm>
+          <a:off x="0" y="0"/>
+          <a:ext cx="0" cy="0"/>
+          <a:chOff x="0" y="0"/>
+          <a:chExt cx="0" cy="0"/>
+        </a:xfrm>
+      </p:grpSpPr>
+      <p:sp>
+        <p:nvSpPr>
+          <p:cNvPr id="2" name="Title 1">
+            <a:extLst>
+              <a:ext uri="{FF2B5EF4-FFF2-40B4-BE49-F238E27FC236}">
+                <a16:creationId xmlns:a16="http://schemas.microsoft.com/office/drawing/2014/main" id="{EA589DF6-D5DE-4CF4-8016-035CD759DB88}"/>
+              </a:ext>
+            </a:extLst>
+          </p:cNvPr>
+          <p:cNvSpPr>
+            <a:spLocks noGrp="1"/>
+          </p:cNvSpPr>
+          <p:nvPr>
+            <p:ph type="title"/>
+          </p:nvPr>
+        </p:nvSpPr>
+        <p:spPr>
+          <a:xfrm>
+            <a:off x="677334" y="247887"/>
+            <a:ext cx="9711004" cy="568751"/>
+          </a:xfrm>
+        </p:spPr>
+        <p:txBody>
+          <a:bodyPr>
+            <a:normAutofit fontScale="90000"/>
+          </a:bodyPr>
+          <a:lstStyle/>
+          <a:p>
+            <a:r>
+              <a:rPr lang="en-CA" dirty="0">
+                <a:latin typeface="Tw Cen MT" panose="020B0602020104020603" pitchFamily="34" charset="0"/>
+              </a:rPr>
+              <a:t>DATA EXPLORATION</a:t>
+            </a:r>
+          </a:p>
+        </p:txBody>
+      </p:sp>
+      <p:sp>
+        <p:nvSpPr>
+          <p:cNvPr id="3" name="Content Placeholder 2">
+            <a:extLst>
+              <a:ext uri="{FF2B5EF4-FFF2-40B4-BE49-F238E27FC236}">
+                <a16:creationId xmlns:a16="http://schemas.microsoft.com/office/drawing/2014/main" id="{9864056A-5D51-4C12-9F12-E255804EFC9A}"/>
+              </a:ext>
+            </a:extLst>
+          </p:cNvPr>
+          <p:cNvSpPr>
+            <a:spLocks noGrp="1"/>
+          </p:cNvSpPr>
+          <p:nvPr>
+            <p:ph idx="1"/>
+          </p:nvPr>
+        </p:nvSpPr>
+        <p:spPr>
+          <a:xfrm>
+            <a:off x="386500" y="925047"/>
+            <a:ext cx="8917757" cy="5932953"/>
+          </a:xfrm>
+        </p:spPr>
+        <p:txBody>
+          <a:bodyPr>
+            <a:noAutofit/>
+          </a:bodyPr>
+          <a:lstStyle/>
+          <a:p>
+            <a:r>
+              <a:rPr lang="en-CA" sz="2400" dirty="0">
+                <a:latin typeface="Tw Cen MT" panose="020B0602020104020603" pitchFamily="34" charset="0"/>
+              </a:rPr>
+              <a:t>We will take a look at the top few rows of the dataset</a:t>
+            </a:r>
+          </a:p>
+          <a:p>
+            <a:pPr marL="0" indent="0">
+              <a:buNone/>
+            </a:pPr>
+            <a:endParaRPr lang="en-CA" sz="2400" dirty="0">
+              <a:latin typeface="Tw Cen MT" panose="020B0602020104020603" pitchFamily="34" charset="0"/>
+            </a:endParaRPr>
+          </a:p>
+          <a:p>
+            <a:pPr marL="0" indent="0">
+              <a:buNone/>
+            </a:pPr>
+            <a:endParaRPr lang="en-CA" sz="2400" dirty="0">
+              <a:latin typeface="Tw Cen MT" panose="020B0602020104020603" pitchFamily="34" charset="0"/>
+            </a:endParaRPr>
+          </a:p>
+          <a:p>
+            <a:pPr marL="0" indent="0">
+              <a:buNone/>
+            </a:pPr>
+            <a:r>
+              <a:rPr lang="en-CA" sz="2200" dirty="0">
+                <a:latin typeface="Tw Cen MT" panose="020B0602020104020603" pitchFamily="34" charset="0"/>
+              </a:rPr>
+              <a:t> </a:t>
+            </a:r>
+          </a:p>
+          <a:p>
+            <a:pPr marL="0" indent="0">
+              <a:buNone/>
+            </a:pPr>
+            <a:endParaRPr lang="en-US" sz="2400" dirty="0">
+              <a:latin typeface="Tw Cen MT" panose="020B0602020104020603" pitchFamily="34" charset="0"/>
+            </a:endParaRPr>
+          </a:p>
+          <a:p>
+            <a:endParaRPr lang="en-US" sz="2400" dirty="0">
+              <a:latin typeface="Tw Cen MT" panose="020B0602020104020603" pitchFamily="34" charset="0"/>
+            </a:endParaRPr>
+          </a:p>
+        </p:txBody>
+      </p:sp>
+      <p:sp>
+        <p:nvSpPr>
+          <p:cNvPr id="10" name="TextBox 9">
+            <a:extLst>
+              <a:ext uri="{FF2B5EF4-FFF2-40B4-BE49-F238E27FC236}">
+                <a16:creationId xmlns:a16="http://schemas.microsoft.com/office/drawing/2014/main" id="{1E241E96-485D-46A9-B522-3273CD0F59CE}"/>
+              </a:ext>
+            </a:extLst>
+          </p:cNvPr>
+          <p:cNvSpPr txBox="1"/>
+          <p:nvPr/>
+        </p:nvSpPr>
+        <p:spPr>
+          <a:xfrm>
+            <a:off x="677334" y="1563023"/>
+            <a:ext cx="7401438" cy="369332"/>
+          </a:xfrm>
+          <a:prstGeom prst="rect">
+            <a:avLst/>
+          </a:prstGeom>
+          <a:noFill/>
+          <a:ln>
+            <a:solidFill>
+              <a:schemeClr val="accent1">
+                <a:lumMod val="60000"/>
+                <a:lumOff val="40000"/>
+              </a:schemeClr>
+            </a:solidFill>
+          </a:ln>
+        </p:spPr>
+        <p:txBody>
+          <a:bodyPr wrap="square" rtlCol="0">
+            <a:spAutoFit/>
+          </a:bodyPr>
+          <a:lstStyle/>
+          <a:p>
+            <a:r>
+              <a:rPr lang="en-CA" b="1" dirty="0" err="1">
+                <a:latin typeface="Tw Cen MT" panose="020B0602020104020603" pitchFamily="34" charset="0"/>
+              </a:rPr>
+              <a:t>train_data_sample.head</a:t>
+            </a:r>
+            <a:r>
+              <a:rPr lang="en-CA" b="1" dirty="0">
+                <a:latin typeface="Tw Cen MT" panose="020B0602020104020603" pitchFamily="34" charset="0"/>
+              </a:rPr>
+              <a:t>()</a:t>
+            </a:r>
+          </a:p>
+        </p:txBody>
+      </p:sp>
+      <p:pic>
+        <p:nvPicPr>
+          <p:cNvPr id="12" name="Picture 11">
+            <a:extLst>
+              <a:ext uri="{FF2B5EF4-FFF2-40B4-BE49-F238E27FC236}">
+                <a16:creationId xmlns:a16="http://schemas.microsoft.com/office/drawing/2014/main" id="{F405B656-1BF8-428A-AA81-51013786D610}"/>
+              </a:ext>
+            </a:extLst>
+          </p:cNvPr>
+          <p:cNvPicPr>
+            <a:picLocks noChangeAspect="1"/>
+          </p:cNvPicPr>
+          <p:nvPr/>
+        </p:nvPicPr>
+        <p:blipFill>
+          <a:blip r:embed="rId2">
+            <a:extLst>
+              <a:ext uri="{28A0092B-C50C-407E-A947-70E740481C1C}">
+                <a14:useLocalDpi xmlns:a14="http://schemas.microsoft.com/office/drawing/2010/main" val="0"/>
+              </a:ext>
+            </a:extLst>
+          </a:blip>
+          <a:stretch>
+            <a:fillRect/>
+          </a:stretch>
+        </p:blipFill>
+        <p:spPr>
+          <a:xfrm>
+            <a:off x="677334" y="2300943"/>
+            <a:ext cx="8808549" cy="3421127"/>
+          </a:xfrm>
+          <a:prstGeom prst="rect">
+            <a:avLst/>
+          </a:prstGeom>
+        </p:spPr>
+      </p:pic>
+    </p:spTree>
+    <p:extLst>
+      <p:ext uri="{BB962C8B-B14F-4D97-AF65-F5344CB8AC3E}">
+        <p14:creationId xmlns:p14="http://schemas.microsoft.com/office/powerpoint/2010/main" val="1483160253"/>
+      </p:ext>
+    </p:extLst>
+  </p:cSld>
+  <p:clrMapOvr>
+    <a:masterClrMapping/>
+  </p:clrMapOvr>
+</p:sld>
+</file>
+
+<file path=ppt/slides/slide8.xml><?xml version="1.0" encoding="utf-8"?>
+<p:sld xmlns:a="http://schemas.openxmlformats.org/drawingml/2006/main" xmlns:r="http://schemas.openxmlformats.org/officeDocument/2006/relationships" xmlns:p="http://schemas.openxmlformats.org/presentationml/2006/main">
+  <p:cSld>
+    <p:spTree>
+      <p:nvGrpSpPr>
+        <p:cNvPr id="1" name=""/>
+        <p:cNvGrpSpPr/>
+        <p:nvPr/>
+      </p:nvGrpSpPr>
+      <p:grpSpPr>
+        <a:xfrm>
+          <a:off x="0" y="0"/>
+          <a:ext cx="0" cy="0"/>
+          <a:chOff x="0" y="0"/>
+          <a:chExt cx="0" cy="0"/>
+        </a:xfrm>
+      </p:grpSpPr>
+      <p:sp>
+        <p:nvSpPr>
+          <p:cNvPr id="2" name="Title 1">
+            <a:extLst>
+              <a:ext uri="{FF2B5EF4-FFF2-40B4-BE49-F238E27FC236}">
+                <a16:creationId xmlns:a16="http://schemas.microsoft.com/office/drawing/2014/main" id="{EA589DF6-D5DE-4CF4-8016-035CD759DB88}"/>
+              </a:ext>
+            </a:extLst>
+          </p:cNvPr>
+          <p:cNvSpPr>
+            <a:spLocks noGrp="1"/>
+          </p:cNvSpPr>
+          <p:nvPr>
+            <p:ph type="title"/>
+          </p:nvPr>
+        </p:nvSpPr>
+        <p:spPr>
+          <a:xfrm>
+            <a:off x="677334" y="247887"/>
+            <a:ext cx="9711004" cy="568751"/>
+          </a:xfrm>
+        </p:spPr>
+        <p:txBody>
+          <a:bodyPr>
+            <a:normAutofit fontScale="90000"/>
+          </a:bodyPr>
+          <a:lstStyle/>
+          <a:p>
+            <a:r>
+              <a:rPr lang="en-CA" dirty="0">
+                <a:latin typeface="Tw Cen MT" panose="020B0602020104020603" pitchFamily="34" charset="0"/>
+              </a:rPr>
+              <a:t>DATA EXPLORATION</a:t>
+            </a:r>
+          </a:p>
+        </p:txBody>
+      </p:sp>
+      <p:sp>
+        <p:nvSpPr>
+          <p:cNvPr id="3" name="Content Placeholder 2">
+            <a:extLst>
+              <a:ext uri="{FF2B5EF4-FFF2-40B4-BE49-F238E27FC236}">
+                <a16:creationId xmlns:a16="http://schemas.microsoft.com/office/drawing/2014/main" id="{9864056A-5D51-4C12-9F12-E255804EFC9A}"/>
+              </a:ext>
+            </a:extLst>
+          </p:cNvPr>
+          <p:cNvSpPr>
+            <a:spLocks noGrp="1"/>
+          </p:cNvSpPr>
+          <p:nvPr>
+            <p:ph idx="1"/>
+          </p:nvPr>
+        </p:nvSpPr>
+        <p:spPr>
+          <a:xfrm>
+            <a:off x="386500" y="925047"/>
+            <a:ext cx="8917757" cy="5932953"/>
+          </a:xfrm>
+        </p:spPr>
+        <p:txBody>
+          <a:bodyPr>
+            <a:noAutofit/>
+          </a:bodyPr>
+          <a:lstStyle/>
+          <a:p>
+            <a:r>
+              <a:rPr lang="en-CA" sz="2400" dirty="0">
+                <a:latin typeface="Tw Cen MT" panose="020B0602020104020603" pitchFamily="34" charset="0"/>
+              </a:rPr>
+              <a:t>To better understand the data, we built a “</a:t>
+            </a:r>
+            <a:r>
+              <a:rPr lang="en-CA" sz="2400" dirty="0" err="1">
+                <a:latin typeface="Tw Cen MT" panose="020B0602020104020603" pitchFamily="34" charset="0"/>
+              </a:rPr>
+              <a:t>Countvectorizer</a:t>
+            </a:r>
+            <a:r>
+              <a:rPr lang="en-CA" sz="2400" dirty="0">
+                <a:latin typeface="Tw Cen MT" panose="020B0602020104020603" pitchFamily="34" charset="0"/>
+              </a:rPr>
+              <a:t>” with a minimum document frequency of 2 and included regex commands to discard numbers, symbols &amp; special characters. </a:t>
+            </a:r>
+          </a:p>
+          <a:p>
+            <a:r>
+              <a:rPr lang="en-CA" sz="2400" dirty="0">
+                <a:latin typeface="Tw Cen MT" panose="020B0602020104020603" pitchFamily="34" charset="0"/>
+              </a:rPr>
+              <a:t>For now, we chose to build a ‘unigram’ </a:t>
+            </a:r>
+          </a:p>
+          <a:p>
+            <a:r>
+              <a:rPr lang="en-CA" sz="2400" dirty="0">
+                <a:latin typeface="Tw Cen MT" panose="020B0602020104020603" pitchFamily="34" charset="0"/>
+              </a:rPr>
+              <a:t>We produced a bag of words </a:t>
+            </a:r>
+            <a:r>
+              <a:rPr lang="en-CA" sz="2400" dirty="0" err="1">
+                <a:latin typeface="Tw Cen MT" panose="020B0602020104020603" pitchFamily="34" charset="0"/>
+              </a:rPr>
+              <a:t>dataframe</a:t>
+            </a:r>
+            <a:r>
+              <a:rPr lang="en-CA" sz="2400" dirty="0">
+                <a:latin typeface="Tw Cen MT" panose="020B0602020104020603" pitchFamily="34" charset="0"/>
+              </a:rPr>
+              <a:t>, </a:t>
+            </a:r>
+            <a:r>
+              <a:rPr lang="en-CA" sz="2400" dirty="0" err="1">
+                <a:latin typeface="Tw Cen MT" panose="020B0602020104020603" pitchFamily="34" charset="0"/>
+              </a:rPr>
+              <a:t>cv_matrix_df</a:t>
+            </a:r>
+            <a:endParaRPr lang="en-CA" sz="2400" dirty="0">
+              <a:latin typeface="Tw Cen MT" panose="020B0602020104020603" pitchFamily="34" charset="0"/>
+            </a:endParaRPr>
+          </a:p>
+          <a:p>
+            <a:pPr marL="0" indent="0">
+              <a:buNone/>
+            </a:pPr>
+            <a:endParaRPr lang="en-CA" sz="2400" dirty="0">
+              <a:latin typeface="Tw Cen MT" panose="020B0602020104020603" pitchFamily="34" charset="0"/>
+            </a:endParaRPr>
+          </a:p>
+          <a:p>
+            <a:pPr marL="0" indent="0">
+              <a:buNone/>
+            </a:pPr>
+            <a:endParaRPr lang="en-CA" sz="2400" dirty="0">
+              <a:latin typeface="Tw Cen MT" panose="020B0602020104020603" pitchFamily="34" charset="0"/>
+            </a:endParaRPr>
+          </a:p>
+          <a:p>
+            <a:pPr marL="0" indent="0">
+              <a:buNone/>
+            </a:pPr>
+            <a:r>
+              <a:rPr lang="en-CA" sz="2200" dirty="0">
+                <a:latin typeface="Tw Cen MT" panose="020B0602020104020603" pitchFamily="34" charset="0"/>
+              </a:rPr>
+              <a:t> </a:t>
+            </a:r>
+          </a:p>
+          <a:p>
+            <a:pPr marL="0" indent="0">
+              <a:buNone/>
+            </a:pPr>
+            <a:endParaRPr lang="en-US" sz="2400" dirty="0">
+              <a:latin typeface="Tw Cen MT" panose="020B0602020104020603" pitchFamily="34" charset="0"/>
+            </a:endParaRPr>
+          </a:p>
+          <a:p>
+            <a:endParaRPr lang="en-US" sz="2400" dirty="0">
+              <a:latin typeface="Tw Cen MT" panose="020B0602020104020603" pitchFamily="34" charset="0"/>
+            </a:endParaRPr>
+          </a:p>
+        </p:txBody>
+      </p:sp>
+      <p:sp>
+        <p:nvSpPr>
+          <p:cNvPr id="6" name="TextBox 5">
+            <a:extLst>
+              <a:ext uri="{FF2B5EF4-FFF2-40B4-BE49-F238E27FC236}">
+                <a16:creationId xmlns:a16="http://schemas.microsoft.com/office/drawing/2014/main" id="{E404FD3B-E07B-4A2E-806A-FFC775126DDA}"/>
+              </a:ext>
+            </a:extLst>
+          </p:cNvPr>
+          <p:cNvSpPr txBox="1"/>
+          <p:nvPr/>
+        </p:nvSpPr>
+        <p:spPr>
+          <a:xfrm>
+            <a:off x="677334" y="3177817"/>
+            <a:ext cx="8917757" cy="3139321"/>
+          </a:xfrm>
+          <a:prstGeom prst="rect">
+            <a:avLst/>
+          </a:prstGeom>
+          <a:noFill/>
+          <a:ln>
+            <a:solidFill>
+              <a:schemeClr val="accent1">
+                <a:lumMod val="60000"/>
+                <a:lumOff val="40000"/>
+              </a:schemeClr>
+            </a:solidFill>
+          </a:ln>
+        </p:spPr>
+        <p:txBody>
+          <a:bodyPr wrap="square" rtlCol="0">
+            <a:spAutoFit/>
+          </a:bodyPr>
+          <a:lstStyle/>
+          <a:p>
+            <a:r>
+              <a:rPr lang="en-CA" b="1" dirty="0">
+                <a:latin typeface="Tw Cen MT" panose="020B0602020104020603" pitchFamily="34" charset="0"/>
+              </a:rPr>
+              <a:t># create a </a:t>
+            </a:r>
+            <a:r>
+              <a:rPr lang="en-CA" b="1" dirty="0" err="1">
+                <a:latin typeface="Tw Cen MT" panose="020B0602020104020603" pitchFamily="34" charset="0"/>
+              </a:rPr>
+              <a:t>CountVectorizer</a:t>
+            </a:r>
+            <a:r>
+              <a:rPr lang="en-CA" b="1" dirty="0">
+                <a:latin typeface="Tw Cen MT" panose="020B0602020104020603" pitchFamily="34" charset="0"/>
+              </a:rPr>
+              <a:t> from raw data, with options to clean it</a:t>
+            </a:r>
+          </a:p>
+          <a:p>
+            <a:r>
+              <a:rPr lang="en-CA" b="1" dirty="0">
+                <a:latin typeface="Tw Cen MT" panose="020B0602020104020603" pitchFamily="34" charset="0"/>
+              </a:rPr>
+              <a:t>cv = </a:t>
+            </a:r>
+            <a:r>
+              <a:rPr lang="en-CA" b="1" dirty="0" err="1">
+                <a:latin typeface="Tw Cen MT" panose="020B0602020104020603" pitchFamily="34" charset="0"/>
+              </a:rPr>
+              <a:t>CountVectorizer</a:t>
+            </a:r>
+            <a:r>
+              <a:rPr lang="en-CA" b="1" dirty="0">
+                <a:latin typeface="Tw Cen MT" panose="020B0602020104020603" pitchFamily="34" charset="0"/>
+              </a:rPr>
+              <a:t>(</a:t>
+            </a:r>
+            <a:r>
+              <a:rPr lang="en-CA" b="1" dirty="0" err="1">
+                <a:latin typeface="Tw Cen MT" panose="020B0602020104020603" pitchFamily="34" charset="0"/>
+              </a:rPr>
+              <a:t>min_df</a:t>
+            </a:r>
+            <a:r>
+              <a:rPr lang="en-CA" b="1" dirty="0">
+                <a:latin typeface="Tw Cen MT" panose="020B0602020104020603" pitchFamily="34" charset="0"/>
+              </a:rPr>
+              <a:t> = 2, lowercase = True, </a:t>
+            </a:r>
+            <a:r>
+              <a:rPr lang="en-CA" b="1" dirty="0" err="1">
+                <a:latin typeface="Tw Cen MT" panose="020B0602020104020603" pitchFamily="34" charset="0"/>
+              </a:rPr>
+              <a:t>token_pattern</a:t>
+            </a:r>
+            <a:r>
+              <a:rPr lang="en-CA" b="1" dirty="0">
+                <a:latin typeface="Tw Cen MT" panose="020B0602020104020603" pitchFamily="34" charset="0"/>
+              </a:rPr>
+              <a:t>=r'(?u)\b[A-Za-z]{2,}\b', </a:t>
+            </a:r>
+          </a:p>
+          <a:p>
+            <a:r>
+              <a:rPr lang="en-CA" b="1" dirty="0">
+                <a:latin typeface="Tw Cen MT" panose="020B0602020104020603" pitchFamily="34" charset="0"/>
+              </a:rPr>
+              <a:t>                        </a:t>
+            </a:r>
+            <a:r>
+              <a:rPr lang="en-CA" b="1" dirty="0" err="1">
+                <a:latin typeface="Tw Cen MT" panose="020B0602020104020603" pitchFamily="34" charset="0"/>
+              </a:rPr>
+              <a:t>strip_accents</a:t>
+            </a:r>
+            <a:r>
+              <a:rPr lang="en-CA" b="1" dirty="0">
+                <a:latin typeface="Tw Cen MT" panose="020B0602020104020603" pitchFamily="34" charset="0"/>
+              </a:rPr>
+              <a:t> = 'ascii', </a:t>
+            </a:r>
+            <a:r>
+              <a:rPr lang="en-CA" b="1" dirty="0" err="1">
+                <a:latin typeface="Tw Cen MT" panose="020B0602020104020603" pitchFamily="34" charset="0"/>
+              </a:rPr>
+              <a:t>ngram_range</a:t>
+            </a:r>
+            <a:r>
+              <a:rPr lang="en-CA" b="1" dirty="0">
+                <a:latin typeface="Tw Cen MT" panose="020B0602020104020603" pitchFamily="34" charset="0"/>
+              </a:rPr>
+              <a:t> = (1, 1), </a:t>
+            </a:r>
+          </a:p>
+          <a:p>
+            <a:r>
+              <a:rPr lang="en-CA" b="1" dirty="0">
+                <a:latin typeface="Tw Cen MT" panose="020B0602020104020603" pitchFamily="34" charset="0"/>
+              </a:rPr>
+              <a:t>                        </a:t>
+            </a:r>
+            <a:r>
+              <a:rPr lang="en-CA" b="1" dirty="0" err="1">
+                <a:latin typeface="Tw Cen MT" panose="020B0602020104020603" pitchFamily="34" charset="0"/>
+              </a:rPr>
+              <a:t>stop_words</a:t>
+            </a:r>
+            <a:r>
+              <a:rPr lang="en-CA" b="1" dirty="0">
+                <a:latin typeface="Tw Cen MT" panose="020B0602020104020603" pitchFamily="34" charset="0"/>
+              </a:rPr>
+              <a:t> = '</a:t>
+            </a:r>
+            <a:r>
+              <a:rPr lang="en-CA" b="1" dirty="0" err="1">
+                <a:latin typeface="Tw Cen MT" panose="020B0602020104020603" pitchFamily="34" charset="0"/>
+              </a:rPr>
+              <a:t>english</a:t>
+            </a:r>
+            <a:r>
+              <a:rPr lang="en-CA" b="1" dirty="0">
+                <a:latin typeface="Tw Cen MT" panose="020B0602020104020603" pitchFamily="34" charset="0"/>
+              </a:rPr>
+              <a:t>')</a:t>
+            </a:r>
+          </a:p>
+          <a:p>
+            <a:r>
+              <a:rPr lang="en-CA" b="1" dirty="0" err="1">
+                <a:latin typeface="Tw Cen MT" panose="020B0602020104020603" pitchFamily="34" charset="0"/>
+              </a:rPr>
+              <a:t>cv_matrix</a:t>
+            </a:r>
+            <a:r>
+              <a:rPr lang="en-CA" b="1" dirty="0">
+                <a:latin typeface="Tw Cen MT" panose="020B0602020104020603" pitchFamily="34" charset="0"/>
+              </a:rPr>
+              <a:t> = </a:t>
+            </a:r>
+            <a:r>
+              <a:rPr lang="en-CA" b="1" dirty="0" err="1">
+                <a:latin typeface="Tw Cen MT" panose="020B0602020104020603" pitchFamily="34" charset="0"/>
+              </a:rPr>
+              <a:t>cv.fit_transform</a:t>
+            </a:r>
+            <a:r>
+              <a:rPr lang="en-CA" b="1" dirty="0">
+                <a:latin typeface="Tw Cen MT" panose="020B0602020104020603" pitchFamily="34" charset="0"/>
+              </a:rPr>
+              <a:t>(</a:t>
+            </a:r>
+            <a:r>
+              <a:rPr lang="en-CA" b="1" dirty="0" err="1">
+                <a:latin typeface="Tw Cen MT" panose="020B0602020104020603" pitchFamily="34" charset="0"/>
+              </a:rPr>
+              <a:t>train_data_sample.headline</a:t>
+            </a:r>
+            <a:r>
+              <a:rPr lang="en-CA" b="1" dirty="0">
+                <a:latin typeface="Tw Cen MT" panose="020B0602020104020603" pitchFamily="34" charset="0"/>
+              </a:rPr>
+              <a:t>).</a:t>
+            </a:r>
+            <a:r>
+              <a:rPr lang="en-CA" b="1" dirty="0" err="1">
+                <a:latin typeface="Tw Cen MT" panose="020B0602020104020603" pitchFamily="34" charset="0"/>
+              </a:rPr>
+              <a:t>toarray</a:t>
+            </a:r>
+            <a:r>
+              <a:rPr lang="en-CA" b="1" dirty="0">
+                <a:latin typeface="Tw Cen MT" panose="020B0602020104020603" pitchFamily="34" charset="0"/>
+              </a:rPr>
+              <a:t>()</a:t>
+            </a:r>
+          </a:p>
+          <a:p>
+            <a:br>
+              <a:rPr lang="en-CA" b="1" dirty="0">
+                <a:latin typeface="Tw Cen MT" panose="020B0602020104020603" pitchFamily="34" charset="0"/>
+              </a:rPr>
+            </a:br>
+            <a:r>
+              <a:rPr lang="en-CA" b="1" dirty="0">
+                <a:latin typeface="Tw Cen MT" panose="020B0602020104020603" pitchFamily="34" charset="0"/>
+              </a:rPr>
+              <a:t># get all unique words in the corpus</a:t>
+            </a:r>
+          </a:p>
+          <a:p>
+            <a:r>
+              <a:rPr lang="en-CA" b="1" dirty="0">
+                <a:latin typeface="Tw Cen MT" panose="020B0602020104020603" pitchFamily="34" charset="0"/>
+              </a:rPr>
+              <a:t>vocab = </a:t>
+            </a:r>
+            <a:r>
+              <a:rPr lang="en-CA" b="1" dirty="0" err="1">
+                <a:latin typeface="Tw Cen MT" panose="020B0602020104020603" pitchFamily="34" charset="0"/>
+              </a:rPr>
+              <a:t>cv.get_feature_names</a:t>
+            </a:r>
+            <a:r>
+              <a:rPr lang="en-CA" b="1" dirty="0">
+                <a:latin typeface="Tw Cen MT" panose="020B0602020104020603" pitchFamily="34" charset="0"/>
+              </a:rPr>
+              <a:t>()</a:t>
+            </a:r>
+          </a:p>
+          <a:p>
+            <a:br>
+              <a:rPr lang="en-CA" b="1" dirty="0">
+                <a:latin typeface="Tw Cen MT" panose="020B0602020104020603" pitchFamily="34" charset="0"/>
+              </a:rPr>
+            </a:br>
+            <a:r>
+              <a:rPr lang="en-CA" b="1" dirty="0">
+                <a:latin typeface="Tw Cen MT" panose="020B0602020104020603" pitchFamily="34" charset="0"/>
+              </a:rPr>
+              <a:t># produce a </a:t>
+            </a:r>
+            <a:r>
+              <a:rPr lang="en-CA" b="1" dirty="0" err="1">
+                <a:latin typeface="Tw Cen MT" panose="020B0602020104020603" pitchFamily="34" charset="0"/>
+              </a:rPr>
+              <a:t>dataframe</a:t>
+            </a:r>
+            <a:r>
+              <a:rPr lang="en-CA" b="1" dirty="0">
+                <a:latin typeface="Tw Cen MT" panose="020B0602020104020603" pitchFamily="34" charset="0"/>
+              </a:rPr>
+              <a:t> including the feature names</a:t>
+            </a:r>
+          </a:p>
+          <a:p>
+            <a:r>
+              <a:rPr lang="en-CA" b="1" dirty="0" err="1">
+                <a:latin typeface="Tw Cen MT" panose="020B0602020104020603" pitchFamily="34" charset="0"/>
+              </a:rPr>
+              <a:t>cv_matrix_df</a:t>
+            </a:r>
+            <a:r>
+              <a:rPr lang="en-CA" b="1" dirty="0">
+                <a:latin typeface="Tw Cen MT" panose="020B0602020104020603" pitchFamily="34" charset="0"/>
+              </a:rPr>
+              <a:t> = </a:t>
+            </a:r>
+            <a:r>
+              <a:rPr lang="en-CA" b="1" dirty="0" err="1">
+                <a:latin typeface="Tw Cen MT" panose="020B0602020104020603" pitchFamily="34" charset="0"/>
+              </a:rPr>
+              <a:t>pandas.DataFrame</a:t>
+            </a:r>
+            <a:r>
+              <a:rPr lang="en-CA" b="1" dirty="0">
+                <a:latin typeface="Tw Cen MT" panose="020B0602020104020603" pitchFamily="34" charset="0"/>
+              </a:rPr>
+              <a:t>(</a:t>
+            </a:r>
+            <a:r>
+              <a:rPr lang="en-CA" b="1" dirty="0" err="1">
+                <a:latin typeface="Tw Cen MT" panose="020B0602020104020603" pitchFamily="34" charset="0"/>
+              </a:rPr>
+              <a:t>cv_matrix</a:t>
+            </a:r>
+            <a:r>
+              <a:rPr lang="en-CA" b="1" dirty="0">
+                <a:latin typeface="Tw Cen MT" panose="020B0602020104020603" pitchFamily="34" charset="0"/>
+              </a:rPr>
+              <a:t>, columns=vocab)</a:t>
+            </a:r>
+          </a:p>
+        </p:txBody>
+      </p:sp>
+    </p:spTree>
+    <p:extLst>
+      <p:ext uri="{BB962C8B-B14F-4D97-AF65-F5344CB8AC3E}">
+        <p14:creationId xmlns:p14="http://schemas.microsoft.com/office/powerpoint/2010/main" val="3139002772"/>
+      </p:ext>
+    </p:extLst>
+  </p:cSld>
+  <p:clrMapOvr>
+    <a:masterClrMapping/>
+  </p:clrMapOvr>
+</p:sld>
+</file>
+
+<file path=ppt/slides/slide9.xml><?xml version="1.0" encoding="utf-8"?>
+<p:sld xmlns:a="http://schemas.openxmlformats.org/drawingml/2006/main" xmlns:r="http://schemas.openxmlformats.org/officeDocument/2006/relationships" xmlns:p="http://schemas.openxmlformats.org/presentationml/2006/main">
+  <p:cSld>
+    <p:spTree>
+      <p:nvGrpSpPr>
+        <p:cNvPr id="1" name=""/>
+        <p:cNvGrpSpPr/>
+        <p:nvPr/>
+      </p:nvGrpSpPr>
+      <p:grpSpPr>
+        <a:xfrm>
+          <a:off x="0" y="0"/>
+          <a:ext cx="0" cy="0"/>
+          <a:chOff x="0" y="0"/>
+          <a:chExt cx="0" cy="0"/>
+        </a:xfrm>
+      </p:grpSpPr>
+      <p:sp>
+        <p:nvSpPr>
+          <p:cNvPr id="2" name="Title 1">
+            <a:extLst>
+              <a:ext uri="{FF2B5EF4-FFF2-40B4-BE49-F238E27FC236}">
+                <a16:creationId xmlns:a16="http://schemas.microsoft.com/office/drawing/2014/main" id="{EA589DF6-D5DE-4CF4-8016-035CD759DB88}"/>
+              </a:ext>
+            </a:extLst>
+          </p:cNvPr>
+          <p:cNvSpPr>
+            <a:spLocks noGrp="1"/>
+          </p:cNvSpPr>
+          <p:nvPr>
+            <p:ph type="title"/>
+          </p:nvPr>
+        </p:nvSpPr>
+        <p:spPr>
+          <a:xfrm>
+            <a:off x="677334" y="247887"/>
+            <a:ext cx="9711004" cy="568751"/>
+          </a:xfrm>
+        </p:spPr>
+        <p:txBody>
+          <a:bodyPr>
+            <a:normAutofit fontScale="90000"/>
+          </a:bodyPr>
+          <a:lstStyle/>
+          <a:p>
+            <a:r>
+              <a:rPr lang="en-CA" dirty="0">
+                <a:latin typeface="Tw Cen MT" panose="020B0602020104020603" pitchFamily="34" charset="0"/>
+              </a:rPr>
+              <a:t>DATA EXPLORATION</a:t>
+            </a:r>
+          </a:p>
+        </p:txBody>
+      </p:sp>
+      <p:sp>
+        <p:nvSpPr>
+          <p:cNvPr id="3" name="Content Placeholder 2">
+            <a:extLst>
+              <a:ext uri="{FF2B5EF4-FFF2-40B4-BE49-F238E27FC236}">
+                <a16:creationId xmlns:a16="http://schemas.microsoft.com/office/drawing/2014/main" id="{9864056A-5D51-4C12-9F12-E255804EFC9A}"/>
+              </a:ext>
+            </a:extLst>
+          </p:cNvPr>
+          <p:cNvSpPr>
+            <a:spLocks noGrp="1"/>
+          </p:cNvSpPr>
+          <p:nvPr>
+            <p:ph idx="1"/>
+          </p:nvPr>
+        </p:nvSpPr>
+        <p:spPr>
+          <a:xfrm>
+            <a:off x="386500" y="925047"/>
+            <a:ext cx="8917757" cy="5932953"/>
+          </a:xfrm>
+        </p:spPr>
+        <p:txBody>
+          <a:bodyPr>
+            <a:noAutofit/>
+          </a:bodyPr>
+          <a:lstStyle/>
+          <a:p>
+            <a:r>
+              <a:rPr lang="en-CA" sz="2400" dirty="0">
+                <a:latin typeface="Tw Cen MT" panose="020B0602020104020603" pitchFamily="34" charset="0"/>
+              </a:rPr>
+              <a:t>Further manipulating the data, we produced a bar chart of the Top-20 most common words of the headlines of the news articles</a:t>
+            </a:r>
+          </a:p>
+          <a:p>
+            <a:pPr marL="0" indent="0">
+              <a:buNone/>
+            </a:pPr>
+            <a:endParaRPr lang="en-CA" sz="2400" dirty="0">
+              <a:latin typeface="Tw Cen MT" panose="020B0602020104020603" pitchFamily="34" charset="0"/>
+            </a:endParaRPr>
+          </a:p>
+          <a:p>
+            <a:pPr marL="0" indent="0">
+              <a:buNone/>
+            </a:pPr>
+            <a:endParaRPr lang="en-CA" sz="2400" dirty="0">
+              <a:latin typeface="Tw Cen MT" panose="020B0602020104020603" pitchFamily="34" charset="0"/>
+            </a:endParaRPr>
+          </a:p>
+          <a:p>
+            <a:pPr marL="0" indent="0">
+              <a:buNone/>
+            </a:pPr>
+            <a:r>
+              <a:rPr lang="en-CA" sz="2200" dirty="0">
+                <a:latin typeface="Tw Cen MT" panose="020B0602020104020603" pitchFamily="34" charset="0"/>
+              </a:rPr>
+              <a:t> </a:t>
+            </a:r>
+          </a:p>
+          <a:p>
+            <a:pPr marL="0" indent="0">
+              <a:buNone/>
+            </a:pPr>
+            <a:endParaRPr lang="en-US" sz="2400" dirty="0">
+              <a:latin typeface="Tw Cen MT" panose="020B0602020104020603" pitchFamily="34" charset="0"/>
+            </a:endParaRPr>
+          </a:p>
+          <a:p>
+            <a:endParaRPr lang="en-US" sz="2400" dirty="0">
+              <a:latin typeface="Tw Cen MT" panose="020B0602020104020603" pitchFamily="34" charset="0"/>
+            </a:endParaRPr>
+          </a:p>
+        </p:txBody>
+      </p:sp>
+      <p:grpSp>
+        <p:nvGrpSpPr>
+          <p:cNvPr id="6" name="Group 5">
+            <a:extLst>
+              <a:ext uri="{FF2B5EF4-FFF2-40B4-BE49-F238E27FC236}">
+                <a16:creationId xmlns:a16="http://schemas.microsoft.com/office/drawing/2014/main" id="{05DF5753-B66F-45DC-B8DD-2AF2F6AE4A59}"/>
+              </a:ext>
+            </a:extLst>
+          </p:cNvPr>
+          <p:cNvGrpSpPr/>
+          <p:nvPr/>
+        </p:nvGrpSpPr>
+        <p:grpSpPr>
+          <a:xfrm>
+            <a:off x="2375555" y="2177592"/>
+            <a:ext cx="5156462" cy="4595567"/>
+            <a:chOff x="2375555" y="2177592"/>
+            <a:chExt cx="5156462" cy="4595567"/>
+          </a:xfrm>
+        </p:grpSpPr>
+        <p:pic>
+          <p:nvPicPr>
+            <p:cNvPr id="5" name="Picture 4">
+              <a:extLst>
+                <a:ext uri="{FF2B5EF4-FFF2-40B4-BE49-F238E27FC236}">
+                  <a16:creationId xmlns:a16="http://schemas.microsoft.com/office/drawing/2014/main" id="{7A310751-FD21-45B6-ADA3-B399CF70606B}"/>
+                </a:ext>
+              </a:extLst>
+            </p:cNvPr>
+            <p:cNvPicPr>
+              <a:picLocks noChangeAspect="1"/>
+            </p:cNvPicPr>
+            <p:nvPr/>
+          </p:nvPicPr>
+          <p:blipFill>
+            <a:blip r:embed="rId2">
+              <a:extLst>
+                <a:ext uri="{28A0092B-C50C-407E-A947-70E740481C1C}">
+                  <a14:useLocalDpi xmlns:a14="http://schemas.microsoft.com/office/drawing/2010/main" val="0"/>
+                </a:ext>
+              </a:extLst>
+            </a:blip>
+            <a:stretch>
+              <a:fillRect/>
+            </a:stretch>
+          </p:blipFill>
+          <p:spPr>
+            <a:xfrm>
+              <a:off x="2375555" y="2507550"/>
+              <a:ext cx="5156462" cy="4265609"/>
+            </a:xfrm>
+            <a:prstGeom prst="rect">
+              <a:avLst/>
+            </a:prstGeom>
+          </p:spPr>
+        </p:pic>
+        <p:sp>
+          <p:nvSpPr>
+            <p:cNvPr id="4" name="TextBox 3">
+              <a:extLst>
+                <a:ext uri="{FF2B5EF4-FFF2-40B4-BE49-F238E27FC236}">
+                  <a16:creationId xmlns:a16="http://schemas.microsoft.com/office/drawing/2014/main" id="{0F76C81C-961F-4868-9145-5EECB9309808}"/>
+                </a:ext>
+              </a:extLst>
+            </p:cNvPr>
+            <p:cNvSpPr txBox="1"/>
+            <p:nvPr/>
+          </p:nvSpPr>
+          <p:spPr>
+            <a:xfrm>
+              <a:off x="2922309" y="2177592"/>
+              <a:ext cx="4279769" cy="369332"/>
+            </a:xfrm>
+            <a:prstGeom prst="rect">
+              <a:avLst/>
+            </a:prstGeom>
+            <a:noFill/>
+          </p:spPr>
+          <p:txBody>
+            <a:bodyPr wrap="square" rtlCol="0">
+              <a:spAutoFit/>
+            </a:bodyPr>
+            <a:lstStyle/>
+            <a:p>
+              <a:pPr algn="ctr"/>
+              <a:r>
+                <a:rPr lang="en-CA" dirty="0">
+                  <a:latin typeface="Tw Cen MT" panose="020B0602020104020603" pitchFamily="34" charset="0"/>
+                </a:rPr>
+                <a:t>Top 20 most common words </a:t>
+              </a:r>
+            </a:p>
+          </p:txBody>
+        </p:sp>
+      </p:grpSp>
+    </p:spTree>
+    <p:extLst>
+      <p:ext uri="{BB962C8B-B14F-4D97-AF65-F5344CB8AC3E}">
+        <p14:creationId xmlns:p14="http://schemas.microsoft.com/office/powerpoint/2010/main" val="3187264481"/>
       </p:ext>
     </p:extLst>
   </p:cSld>

</xml_diff>

<commit_message>
feature engineering including GENSIM
</commit_message>
<xml_diff>
--- a/CSML-1010-Group 20.pptx
+++ b/CSML-1010-Group 20.pptx
@@ -2,7 +2,7 @@
 <file path=ppt/presentation.xml><?xml version="1.0" encoding="utf-8"?>
 <p:presentation xmlns:a="http://schemas.openxmlformats.org/drawingml/2006/main" xmlns:r="http://schemas.openxmlformats.org/officeDocument/2006/relationships" xmlns:p="http://schemas.openxmlformats.org/presentationml/2006/main" saveSubsetFonts="1">
   <p:sldMasterIdLst>
-    <p:sldMasterId id="2147483684" r:id="rId1"/>
+    <p:sldMasterId id="2147483701" r:id="rId1"/>
   </p:sldMasterIdLst>
   <p:sldIdLst>
     <p:sldId id="256" r:id="rId2"/>
@@ -141,7 +141,7 @@
       </p:grpSpPr>
       <p:grpSp>
         <p:nvGrpSpPr>
-          <p:cNvPr id="7" name="Group 6"/>
+          <p:cNvPr id="16" name="Group 15"/>
           <p:cNvGrpSpPr/>
           <p:nvPr/>
         </p:nvGrpSpPr>
@@ -153,9 +153,72 @@
             <a:chExt cx="12192000" cy="6866467"/>
           </a:xfrm>
         </p:grpSpPr>
+        <p:sp>
+          <p:nvSpPr>
+            <p:cNvPr id="15" name="Freeform 14"/>
+            <p:cNvSpPr/>
+            <p:nvPr/>
+          </p:nvSpPr>
+          <p:spPr>
+            <a:xfrm>
+              <a:off x="0" y="-7862"/>
+              <a:ext cx="863600" cy="5698067"/>
+            </a:xfrm>
+            <a:custGeom>
+              <a:avLst/>
+              <a:gdLst/>
+              <a:ahLst/>
+              <a:cxnLst/>
+              <a:rect l="l" t="t" r="r" b="b"/>
+              <a:pathLst>
+                <a:path w="863600" h="5698067">
+                  <a:moveTo>
+                    <a:pt x="0" y="8467"/>
+                  </a:moveTo>
+                  <a:lnTo>
+                    <a:pt x="863600" y="0"/>
+                  </a:lnTo>
+                  <a:lnTo>
+                    <a:pt x="863600" y="16934"/>
+                  </a:lnTo>
+                  <a:lnTo>
+                    <a:pt x="0" y="5698067"/>
+                  </a:lnTo>
+                  <a:lnTo>
+                    <a:pt x="0" y="8467"/>
+                  </a:lnTo>
+                  <a:close/>
+                </a:path>
+              </a:pathLst>
+            </a:custGeom>
+            <a:solidFill>
+              <a:schemeClr val="accent1">
+                <a:alpha val="70000"/>
+              </a:schemeClr>
+            </a:solidFill>
+            <a:ln>
+              <a:noFill/>
+            </a:ln>
+            <a:effectLst/>
+          </p:spPr>
+          <p:style>
+            <a:lnRef idx="1">
+              <a:schemeClr val="accent1"/>
+            </a:lnRef>
+            <a:fillRef idx="3">
+              <a:schemeClr val="accent1"/>
+            </a:fillRef>
+            <a:effectRef idx="2">
+              <a:schemeClr val="accent1"/>
+            </a:effectRef>
+            <a:fontRef idx="minor">
+              <a:schemeClr val="lt1"/>
+            </a:fontRef>
+          </p:style>
+        </p:sp>
         <p:cxnSp>
           <p:nvCxnSpPr>
-            <p:cNvPr id="32" name="Straight Connector 31"/>
+            <p:cNvPr id="19" name="Straight Connector 18"/>
             <p:cNvCxnSpPr/>
             <p:nvPr/>
           </p:nvCxnSpPr>
@@ -169,8 +232,8 @@
             </a:prstGeom>
             <a:ln w="9525">
               <a:solidFill>
-                <a:schemeClr val="bg1">
-                  <a:lumMod val="75000"/>
+                <a:schemeClr val="accent1">
+                  <a:alpha val="70000"/>
                 </a:schemeClr>
               </a:solidFill>
             </a:ln>
@@ -192,7 +255,7 @@
         </p:cxnSp>
         <p:cxnSp>
           <p:nvCxnSpPr>
-            <p:cNvPr id="21" name="Straight Connector 20"/>
+            <p:cNvPr id="20" name="Straight Connector 19"/>
             <p:cNvCxnSpPr/>
             <p:nvPr/>
           </p:nvCxnSpPr>
@@ -206,8 +269,8 @@
             </a:prstGeom>
             <a:ln w="9525">
               <a:solidFill>
-                <a:schemeClr val="bg1">
-                  <a:lumMod val="85000"/>
+                <a:schemeClr val="accent1">
+                  <a:alpha val="70000"/>
                 </a:schemeClr>
               </a:solidFill>
             </a:ln>
@@ -229,7 +292,7 @@
         </p:cxnSp>
         <p:sp>
           <p:nvSpPr>
-            <p:cNvPr id="24" name="Rectangle 23"/>
+            <p:cNvPr id="21" name="Rectangle 23"/>
             <p:cNvSpPr/>
             <p:nvPr/>
           </p:nvSpPr>
@@ -267,7 +330,7 @@
             </a:custGeom>
             <a:solidFill>
               <a:schemeClr val="accent1">
-                <a:alpha val="30000"/>
+                <a:alpha val="36000"/>
               </a:schemeClr>
             </a:solidFill>
             <a:ln>
@@ -292,7 +355,7 @@
         </p:sp>
         <p:sp>
           <p:nvSpPr>
-            <p:cNvPr id="26" name="Rectangle 25"/>
+            <p:cNvPr id="22" name="Rectangle 25"/>
             <p:cNvSpPr/>
             <p:nvPr/>
           </p:nvSpPr>
@@ -355,7 +418,7 @@
         </p:sp>
         <p:sp>
           <p:nvSpPr>
-            <p:cNvPr id="27" name="Isosceles Triangle 26"/>
+            <p:cNvPr id="23" name="Isosceles Triangle 22"/>
             <p:cNvSpPr/>
             <p:nvPr/>
           </p:nvSpPr>
@@ -370,8 +433,9 @@
               </a:avLst>
             </a:prstGeom>
             <a:solidFill>
-              <a:schemeClr val="accent2">
-                <a:alpha val="72000"/>
+              <a:schemeClr val="accent1">
+                <a:lumMod val="75000"/>
+                <a:alpha val="66000"/>
               </a:schemeClr>
             </a:solidFill>
             <a:ln>
@@ -396,7 +460,7 @@
         </p:sp>
         <p:sp>
           <p:nvSpPr>
-            <p:cNvPr id="28" name="Rectangle 27"/>
+            <p:cNvPr id="24" name="Rectangle 27"/>
             <p:cNvSpPr/>
             <p:nvPr/>
           </p:nvSpPr>
@@ -433,9 +497,9 @@
               </a:pathLst>
             </a:custGeom>
             <a:solidFill>
-              <a:schemeClr val="accent2">
+              <a:schemeClr val="accent1">
                 <a:lumMod val="75000"/>
-                <a:alpha val="70000"/>
+                <a:alpha val="50000"/>
               </a:schemeClr>
             </a:solidFill>
             <a:ln>
@@ -460,7 +524,7 @@
         </p:sp>
         <p:sp>
           <p:nvSpPr>
-            <p:cNvPr id="29" name="Rectangle 28"/>
+            <p:cNvPr id="25" name="Rectangle 28"/>
             <p:cNvSpPr/>
             <p:nvPr/>
           </p:nvSpPr>
@@ -497,9 +561,7 @@
               </a:pathLst>
             </a:custGeom>
             <a:solidFill>
-              <a:schemeClr val="accent1">
-                <a:lumMod val="60000"/>
-                <a:lumOff val="40000"/>
+              <a:schemeClr val="accent2">
                 <a:alpha val="70000"/>
               </a:schemeClr>
             </a:solidFill>
@@ -525,7 +587,7 @@
         </p:sp>
         <p:sp>
           <p:nvSpPr>
-            <p:cNvPr id="30" name="Rectangle 29"/>
+            <p:cNvPr id="26" name="Rectangle 29"/>
             <p:cNvSpPr/>
             <p:nvPr/>
           </p:nvSpPr>
@@ -562,48 +624,8 @@
               </a:pathLst>
             </a:custGeom>
             <a:solidFill>
-              <a:schemeClr val="accent1">
-                <a:alpha val="65000"/>
-              </a:schemeClr>
-            </a:solidFill>
-            <a:ln>
-              <a:noFill/>
-            </a:ln>
-            <a:effectLst/>
-          </p:spPr>
-          <p:style>
-            <a:lnRef idx="1">
-              <a:schemeClr val="accent1"/>
-            </a:lnRef>
-            <a:fillRef idx="3">
-              <a:schemeClr val="accent1"/>
-            </a:fillRef>
-            <a:effectRef idx="2">
-              <a:schemeClr val="accent1"/>
-            </a:effectRef>
-            <a:fontRef idx="minor">
-              <a:schemeClr val="lt1"/>
-            </a:fontRef>
-          </p:style>
-        </p:sp>
-        <p:sp>
-          <p:nvSpPr>
-            <p:cNvPr id="31" name="Isosceles Triangle 30"/>
-            <p:cNvSpPr/>
-            <p:nvPr/>
-          </p:nvSpPr>
-          <p:spPr>
-            <a:xfrm>
-              <a:off x="10371666" y="3589867"/>
-              <a:ext cx="1817159" cy="3268133"/>
-            </a:xfrm>
-            <a:prstGeom prst="triangle">
-              <a:avLst>
-                <a:gd name="adj" fmla="val 100000"/>
-              </a:avLst>
-            </a:prstGeom>
-            <a:solidFill>
-              <a:schemeClr val="accent1">
+              <a:schemeClr val="accent2">
+                <a:lumMod val="75000"/>
                 <a:alpha val="80000"/>
               </a:schemeClr>
             </a:solidFill>
@@ -629,14 +651,14 @@
         </p:sp>
         <p:sp>
           <p:nvSpPr>
-            <p:cNvPr id="19" name="Isosceles Triangle 18"/>
+            <p:cNvPr id="27" name="Isosceles Triangle 26"/>
             <p:cNvSpPr/>
             <p:nvPr/>
           </p:nvSpPr>
           <p:spPr>
-            <a:xfrm rot="10800000">
-              <a:off x="0" y="0"/>
-              <a:ext cx="842596" cy="5666154"/>
+            <a:xfrm>
+              <a:off x="10371666" y="3589867"/>
+              <a:ext cx="1817159" cy="3268133"/>
             </a:xfrm>
             <a:prstGeom prst="triangle">
               <a:avLst>
@@ -645,7 +667,8 @@
             </a:prstGeom>
             <a:solidFill>
               <a:schemeClr val="accent1">
-                <a:alpha val="85000"/>
+                <a:lumMod val="75000"/>
+                <a:alpha val="66000"/>
               </a:schemeClr>
             </a:solidFill>
             <a:ln>
@@ -844,7 +867,7 @@
           <a:p>
             <a:fld id="{E5B832BA-C66E-4618-9CDA-BB5B0FBA9FBA}" type="datetimeFigureOut">
               <a:rPr lang="en-CA" smtClean="0"/>
-              <a:t>2020-03-29</a:t>
+              <a:t>2020-04-04</a:t>
             </a:fld>
             <a:endParaRPr lang="en-CA"/>
           </a:p>
@@ -895,7 +918,7 @@
     </p:spTree>
     <p:extLst>
       <p:ext uri="{BB962C8B-B14F-4D97-AF65-F5344CB8AC3E}">
-        <p14:creationId xmlns:p14="http://schemas.microsoft.com/office/powerpoint/2010/main" val="3553364839"/>
+        <p14:creationId xmlns:p14="http://schemas.microsoft.com/office/powerpoint/2010/main" val="1361212809"/>
       </p:ext>
     </p:extLst>
   </p:cSld>
@@ -1095,7 +1118,7 @@
           <a:p>
             <a:fld id="{E5B832BA-C66E-4618-9CDA-BB5B0FBA9FBA}" type="datetimeFigureOut">
               <a:rPr lang="en-CA" smtClean="0"/>
-              <a:t>2020-03-29</a:t>
+              <a:t>2020-04-04</a:t>
             </a:fld>
             <a:endParaRPr lang="en-CA"/>
           </a:p>
@@ -1146,7 +1169,7 @@
     </p:spTree>
     <p:extLst>
       <p:ext uri="{BB962C8B-B14F-4D97-AF65-F5344CB8AC3E}">
-        <p14:creationId xmlns:p14="http://schemas.microsoft.com/office/powerpoint/2010/main" val="150404261"/>
+        <p14:creationId xmlns:p14="http://schemas.microsoft.com/office/powerpoint/2010/main" val="3609254188"/>
       </p:ext>
     </p:extLst>
   </p:cSld>
@@ -1409,7 +1432,7 @@
           <a:p>
             <a:fld id="{E5B832BA-C66E-4618-9CDA-BB5B0FBA9FBA}" type="datetimeFigureOut">
               <a:rPr lang="en-CA" smtClean="0"/>
-              <a:t>2020-03-29</a:t>
+              <a:t>2020-04-04</a:t>
             </a:fld>
             <a:endParaRPr lang="en-CA"/>
           </a:p>
@@ -1459,7 +1482,7 @@
       </p:sp>
       <p:sp>
         <p:nvSpPr>
-          <p:cNvPr id="20" name="TextBox 19"/>
+          <p:cNvPr id="24" name="TextBox 23"/>
           <p:cNvSpPr txBox="1"/>
           <p:nvPr/>
         </p:nvSpPr>
@@ -1500,7 +1523,7 @@
       </p:sp>
       <p:sp>
         <p:nvSpPr>
-          <p:cNvPr id="22" name="TextBox 21"/>
+          <p:cNvPr id="25" name="TextBox 24"/>
           <p:cNvSpPr txBox="1"/>
           <p:nvPr/>
         </p:nvSpPr>
@@ -1531,26 +1554,18 @@
                     <a:lumOff val="40000"/>
                   </a:schemeClr>
                 </a:solidFill>
+                <a:effectLst/>
                 <a:latin typeface="Arial"/>
               </a:rPr>
               <a:t>”</a:t>
             </a:r>
-            <a:endParaRPr lang="en-US" dirty="0">
-              <a:solidFill>
-                <a:schemeClr val="accent1">
-                  <a:lumMod val="60000"/>
-                  <a:lumOff val="40000"/>
-                </a:schemeClr>
-              </a:solidFill>
-              <a:latin typeface="Arial"/>
-            </a:endParaRPr>
           </a:p>
         </p:txBody>
       </p:sp>
     </p:spTree>
     <p:extLst>
       <p:ext uri="{BB962C8B-B14F-4D97-AF65-F5344CB8AC3E}">
-        <p14:creationId xmlns:p14="http://schemas.microsoft.com/office/powerpoint/2010/main" val="309113901"/>
+        <p14:creationId xmlns:p14="http://schemas.microsoft.com/office/powerpoint/2010/main" val="2481755297"/>
       </p:ext>
     </p:extLst>
   </p:cSld>
@@ -1750,7 +1765,7 @@
           <a:p>
             <a:fld id="{E5B832BA-C66E-4618-9CDA-BB5B0FBA9FBA}" type="datetimeFigureOut">
               <a:rPr lang="en-CA" smtClean="0"/>
-              <a:t>2020-03-29</a:t>
+              <a:t>2020-04-04</a:t>
             </a:fld>
             <a:endParaRPr lang="en-CA"/>
           </a:p>
@@ -1801,7 +1816,7 @@
     </p:spTree>
     <p:extLst>
       <p:ext uri="{BB962C8B-B14F-4D97-AF65-F5344CB8AC3E}">
-        <p14:creationId xmlns:p14="http://schemas.microsoft.com/office/powerpoint/2010/main" val="4089763967"/>
+        <p14:creationId xmlns:p14="http://schemas.microsoft.com/office/powerpoint/2010/main" val="2208382087"/>
       </p:ext>
     </p:extLst>
   </p:cSld>
@@ -2064,7 +2079,7 @@
           <a:p>
             <a:fld id="{E5B832BA-C66E-4618-9CDA-BB5B0FBA9FBA}" type="datetimeFigureOut">
               <a:rPr lang="en-CA" smtClean="0"/>
-              <a:t>2020-03-29</a:t>
+              <a:t>2020-04-04</a:t>
             </a:fld>
             <a:endParaRPr lang="en-CA"/>
           </a:p>
@@ -2197,7 +2212,7 @@
     </p:spTree>
     <p:extLst>
       <p:ext uri="{BB962C8B-B14F-4D97-AF65-F5344CB8AC3E}">
-        <p14:creationId xmlns:p14="http://schemas.microsoft.com/office/powerpoint/2010/main" val="2611359669"/>
+        <p14:creationId xmlns:p14="http://schemas.microsoft.com/office/powerpoint/2010/main" val="3189679539"/>
       </p:ext>
     </p:extLst>
   </p:cSld>
@@ -2457,7 +2472,7 @@
           <a:p>
             <a:fld id="{E5B832BA-C66E-4618-9CDA-BB5B0FBA9FBA}" type="datetimeFigureOut">
               <a:rPr lang="en-CA" smtClean="0"/>
-              <a:t>2020-03-29</a:t>
+              <a:t>2020-04-04</a:t>
             </a:fld>
             <a:endParaRPr lang="en-CA"/>
           </a:p>
@@ -2508,7 +2523,7 @@
     </p:spTree>
     <p:extLst>
       <p:ext uri="{BB962C8B-B14F-4D97-AF65-F5344CB8AC3E}">
-        <p14:creationId xmlns:p14="http://schemas.microsoft.com/office/powerpoint/2010/main" val="2881514138"/>
+        <p14:creationId xmlns:p14="http://schemas.microsoft.com/office/powerpoint/2010/main" val="715675089"/>
       </p:ext>
     </p:extLst>
   </p:cSld>
@@ -2627,7 +2642,7 @@
           <a:p>
             <a:fld id="{E5B832BA-C66E-4618-9CDA-BB5B0FBA9FBA}" type="datetimeFigureOut">
               <a:rPr lang="en-CA" smtClean="0"/>
-              <a:t>2020-03-29</a:t>
+              <a:t>2020-04-04</a:t>
             </a:fld>
             <a:endParaRPr lang="en-CA"/>
           </a:p>
@@ -2678,7 +2693,7 @@
     </p:spTree>
     <p:extLst>
       <p:ext uri="{BB962C8B-B14F-4D97-AF65-F5344CB8AC3E}">
-        <p14:creationId xmlns:p14="http://schemas.microsoft.com/office/powerpoint/2010/main" val="3905289753"/>
+        <p14:creationId xmlns:p14="http://schemas.microsoft.com/office/powerpoint/2010/main" val="841264960"/>
       </p:ext>
     </p:extLst>
   </p:cSld>
@@ -2807,7 +2822,7 @@
           <a:p>
             <a:fld id="{E5B832BA-C66E-4618-9CDA-BB5B0FBA9FBA}" type="datetimeFigureOut">
               <a:rPr lang="en-CA" smtClean="0"/>
-              <a:t>2020-03-29</a:t>
+              <a:t>2020-04-04</a:t>
             </a:fld>
             <a:endParaRPr lang="en-CA"/>
           </a:p>
@@ -2858,7 +2873,7 @@
     </p:spTree>
     <p:extLst>
       <p:ext uri="{BB962C8B-B14F-4D97-AF65-F5344CB8AC3E}">
-        <p14:creationId xmlns:p14="http://schemas.microsoft.com/office/powerpoint/2010/main" val="3217893667"/>
+        <p14:creationId xmlns:p14="http://schemas.microsoft.com/office/powerpoint/2010/main" val="1480184354"/>
       </p:ext>
     </p:extLst>
   </p:cSld>
@@ -2897,14 +2912,8 @@
         </p:nvSpPr>
         <p:spPr/>
         <p:txBody>
-          <a:bodyPr>
-            <a:normAutofit/>
-          </a:bodyPr>
-          <a:lstStyle>
-            <a:lvl1pPr>
-              <a:defRPr sz="3600"/>
-            </a:lvl1pPr>
-          </a:lstStyle>
+          <a:bodyPr/>
+          <a:lstStyle/>
           <a:p>
             <a:r>
               <a:rPr lang="en-US"/>
@@ -2983,7 +2992,7 @@
           <a:p>
             <a:fld id="{E5B832BA-C66E-4618-9CDA-BB5B0FBA9FBA}" type="datetimeFigureOut">
               <a:rPr lang="en-CA" smtClean="0"/>
-              <a:t>2020-03-29</a:t>
+              <a:t>2020-04-04</a:t>
             </a:fld>
             <a:endParaRPr lang="en-CA"/>
           </a:p>
@@ -3034,7 +3043,7 @@
     </p:spTree>
     <p:extLst>
       <p:ext uri="{BB962C8B-B14F-4D97-AF65-F5344CB8AC3E}">
-        <p14:creationId xmlns:p14="http://schemas.microsoft.com/office/powerpoint/2010/main" val="984881417"/>
+        <p14:creationId xmlns:p14="http://schemas.microsoft.com/office/powerpoint/2010/main" val="62362086"/>
       </p:ext>
     </p:extLst>
   </p:cSld>
@@ -3230,7 +3239,7 @@
           <a:p>
             <a:fld id="{E5B832BA-C66E-4618-9CDA-BB5B0FBA9FBA}" type="datetimeFigureOut">
               <a:rPr lang="en-CA" smtClean="0"/>
-              <a:t>2020-03-29</a:t>
+              <a:t>2020-04-04</a:t>
             </a:fld>
             <a:endParaRPr lang="en-CA"/>
           </a:p>
@@ -3281,7 +3290,7 @@
     </p:spTree>
     <p:extLst>
       <p:ext uri="{BB962C8B-B14F-4D97-AF65-F5344CB8AC3E}">
-        <p14:creationId xmlns:p14="http://schemas.microsoft.com/office/powerpoint/2010/main" val="2414944961"/>
+        <p14:creationId xmlns:p14="http://schemas.microsoft.com/office/powerpoint/2010/main" val="74845846"/>
       </p:ext>
     </p:extLst>
   </p:cSld>
@@ -3462,7 +3471,7 @@
           <a:p>
             <a:fld id="{E5B832BA-C66E-4618-9CDA-BB5B0FBA9FBA}" type="datetimeFigureOut">
               <a:rPr lang="en-CA" smtClean="0"/>
-              <a:t>2020-03-29</a:t>
+              <a:t>2020-04-04</a:t>
             </a:fld>
             <a:endParaRPr lang="en-CA"/>
           </a:p>
@@ -3513,7 +3522,7 @@
     </p:spTree>
     <p:extLst>
       <p:ext uri="{BB962C8B-B14F-4D97-AF65-F5344CB8AC3E}">
-        <p14:creationId xmlns:p14="http://schemas.microsoft.com/office/powerpoint/2010/main" val="4043714727"/>
+        <p14:creationId xmlns:p14="http://schemas.microsoft.com/office/powerpoint/2010/main" val="3015550130"/>
       </p:ext>
     </p:extLst>
   </p:cSld>
@@ -3836,7 +3845,7 @@
           <a:p>
             <a:fld id="{E5B832BA-C66E-4618-9CDA-BB5B0FBA9FBA}" type="datetimeFigureOut">
               <a:rPr lang="en-CA" smtClean="0"/>
-              <a:t>2020-03-29</a:t>
+              <a:t>2020-04-04</a:t>
             </a:fld>
             <a:endParaRPr lang="en-CA"/>
           </a:p>
@@ -3887,7 +3896,7 @@
     </p:spTree>
     <p:extLst>
       <p:ext uri="{BB962C8B-B14F-4D97-AF65-F5344CB8AC3E}">
-        <p14:creationId xmlns:p14="http://schemas.microsoft.com/office/powerpoint/2010/main" val="620663661"/>
+        <p14:creationId xmlns:p14="http://schemas.microsoft.com/office/powerpoint/2010/main" val="1988914793"/>
       </p:ext>
     </p:extLst>
   </p:cSld>
@@ -3959,7 +3968,7 @@
           <a:p>
             <a:fld id="{E5B832BA-C66E-4618-9CDA-BB5B0FBA9FBA}" type="datetimeFigureOut">
               <a:rPr lang="en-CA" smtClean="0"/>
-              <a:t>2020-03-29</a:t>
+              <a:t>2020-04-04</a:t>
             </a:fld>
             <a:endParaRPr lang="en-CA"/>
           </a:p>
@@ -4010,7 +4019,7 @@
     </p:spTree>
     <p:extLst>
       <p:ext uri="{BB962C8B-B14F-4D97-AF65-F5344CB8AC3E}">
-        <p14:creationId xmlns:p14="http://schemas.microsoft.com/office/powerpoint/2010/main" val="3052598918"/>
+        <p14:creationId xmlns:p14="http://schemas.microsoft.com/office/powerpoint/2010/main" val="2763198243"/>
       </p:ext>
     </p:extLst>
   </p:cSld>
@@ -4054,7 +4063,7 @@
           <a:p>
             <a:fld id="{E5B832BA-C66E-4618-9CDA-BB5B0FBA9FBA}" type="datetimeFigureOut">
               <a:rPr lang="en-CA" smtClean="0"/>
-              <a:t>2020-03-29</a:t>
+              <a:t>2020-04-04</a:t>
             </a:fld>
             <a:endParaRPr lang="en-CA"/>
           </a:p>
@@ -4105,7 +4114,7 @@
     </p:spTree>
     <p:extLst>
       <p:ext uri="{BB962C8B-B14F-4D97-AF65-F5344CB8AC3E}">
-        <p14:creationId xmlns:p14="http://schemas.microsoft.com/office/powerpoint/2010/main" val="2817741533"/>
+        <p14:creationId xmlns:p14="http://schemas.microsoft.com/office/powerpoint/2010/main" val="347806412"/>
       </p:ext>
     </p:extLst>
   </p:cSld>
@@ -4309,7 +4318,7 @@
           <a:p>
             <a:fld id="{E5B832BA-C66E-4618-9CDA-BB5B0FBA9FBA}" type="datetimeFigureOut">
               <a:rPr lang="en-CA" smtClean="0"/>
-              <a:t>2020-03-29</a:t>
+              <a:t>2020-04-04</a:t>
             </a:fld>
             <a:endParaRPr lang="en-CA"/>
           </a:p>
@@ -4360,7 +4369,7 @@
     </p:spTree>
     <p:extLst>
       <p:ext uri="{BB962C8B-B14F-4D97-AF65-F5344CB8AC3E}">
-        <p14:creationId xmlns:p14="http://schemas.microsoft.com/office/powerpoint/2010/main" val="2086158180"/>
+        <p14:creationId xmlns:p14="http://schemas.microsoft.com/office/powerpoint/2010/main" val="1321996919"/>
       </p:ext>
     </p:extLst>
   </p:cSld>
@@ -4557,29 +4566,6 @@
       </p:sp>
       <p:sp>
         <p:nvSpPr>
-          <p:cNvPr id="5" name="Date Placeholder 4"/>
-          <p:cNvSpPr>
-            <a:spLocks noGrp="1"/>
-          </p:cNvSpPr>
-          <p:nvPr>
-            <p:ph type="dt" sz="half" idx="10"/>
-          </p:nvPr>
-        </p:nvSpPr>
-        <p:spPr/>
-        <p:txBody>
-          <a:bodyPr/>
-          <a:lstStyle/>
-          <a:p>
-            <a:fld id="{E5B832BA-C66E-4618-9CDA-BB5B0FBA9FBA}" type="datetimeFigureOut">
-              <a:rPr lang="en-CA" smtClean="0"/>
-              <a:t>2020-03-29</a:t>
-            </a:fld>
-            <a:endParaRPr lang="en-CA"/>
-          </a:p>
-        </p:txBody>
-      </p:sp>
-      <p:sp>
-        <p:nvSpPr>
           <p:cNvPr id="6" name="Footer Placeholder 5"/>
           <p:cNvSpPr>
             <a:spLocks noGrp="1"/>
@@ -4620,10 +4606,33 @@
           </a:p>
         </p:txBody>
       </p:sp>
+      <p:sp>
+        <p:nvSpPr>
+          <p:cNvPr id="5" name="Date Placeholder 4"/>
+          <p:cNvSpPr>
+            <a:spLocks noGrp="1"/>
+          </p:cNvSpPr>
+          <p:nvPr>
+            <p:ph type="dt" sz="half" idx="10"/>
+          </p:nvPr>
+        </p:nvSpPr>
+        <p:spPr/>
+        <p:txBody>
+          <a:bodyPr/>
+          <a:lstStyle/>
+          <a:p>
+            <a:fld id="{E5B832BA-C66E-4618-9CDA-BB5B0FBA9FBA}" type="datetimeFigureOut">
+              <a:rPr lang="en-CA" smtClean="0"/>
+              <a:t>2020-04-04</a:t>
+            </a:fld>
+            <a:endParaRPr lang="en-CA"/>
+          </a:p>
+        </p:txBody>
+      </p:sp>
     </p:spTree>
     <p:extLst>
       <p:ext uri="{BB962C8B-B14F-4D97-AF65-F5344CB8AC3E}">
-        <p14:creationId xmlns:p14="http://schemas.microsoft.com/office/powerpoint/2010/main" val="398760355"/>
+        <p14:creationId xmlns:p14="http://schemas.microsoft.com/office/powerpoint/2010/main" val="3234148784"/>
       </p:ext>
     </p:extLst>
   </p:cSld>
@@ -4657,7 +4666,7 @@
       </p:grpSpPr>
       <p:grpSp>
         <p:nvGrpSpPr>
-          <p:cNvPr id="7" name="Group 6"/>
+          <p:cNvPr id="44" name="Group 43"/>
           <p:cNvGrpSpPr/>
           <p:nvPr/>
         </p:nvGrpSpPr>
@@ -4685,8 +4694,8 @@
             </a:prstGeom>
             <a:ln w="9525">
               <a:solidFill>
-                <a:schemeClr val="bg1">
-                  <a:lumMod val="75000"/>
+                <a:schemeClr val="accent1">
+                  <a:alpha val="70000"/>
                 </a:schemeClr>
               </a:solidFill>
             </a:ln>
@@ -4722,8 +4731,8 @@
             </a:prstGeom>
             <a:ln w="9525">
               <a:solidFill>
-                <a:schemeClr val="bg1">
-                  <a:lumMod val="85000"/>
+                <a:schemeClr val="accent1">
+                  <a:alpha val="70000"/>
                 </a:schemeClr>
               </a:solidFill>
             </a:ln>
@@ -4783,7 +4792,7 @@
             </a:custGeom>
             <a:solidFill>
               <a:schemeClr val="accent1">
-                <a:alpha val="30000"/>
+                <a:alpha val="36000"/>
               </a:schemeClr>
             </a:solidFill>
             <a:ln>
@@ -4886,8 +4895,9 @@
               </a:avLst>
             </a:prstGeom>
             <a:solidFill>
-              <a:schemeClr val="accent2">
-                <a:alpha val="72000"/>
+              <a:schemeClr val="accent1">
+                <a:lumMod val="75000"/>
+                <a:alpha val="66000"/>
               </a:schemeClr>
             </a:solidFill>
             <a:ln>
@@ -4949,9 +4959,9 @@
               </a:pathLst>
             </a:custGeom>
             <a:solidFill>
-              <a:schemeClr val="accent2">
+              <a:schemeClr val="accent1">
                 <a:lumMod val="75000"/>
-                <a:alpha val="70000"/>
+                <a:alpha val="50000"/>
               </a:schemeClr>
             </a:solidFill>
             <a:ln>
@@ -5013,9 +5023,7 @@
               </a:pathLst>
             </a:custGeom>
             <a:solidFill>
-              <a:schemeClr val="accent1">
-                <a:lumMod val="60000"/>
-                <a:lumOff val="40000"/>
+              <a:schemeClr val="accent2">
                 <a:alpha val="70000"/>
               </a:schemeClr>
             </a:solidFill>
@@ -5078,8 +5086,9 @@
               </a:pathLst>
             </a:custGeom>
             <a:solidFill>
-              <a:schemeClr val="accent1">
-                <a:alpha val="65000"/>
+              <a:schemeClr val="accent2">
+                <a:lumMod val="75000"/>
+                <a:alpha val="80000"/>
               </a:schemeClr>
             </a:solidFill>
             <a:ln>
@@ -5120,7 +5129,8 @@
             </a:prstGeom>
             <a:solidFill>
               <a:schemeClr val="accent1">
-                <a:alpha val="80000"/>
+                <a:lumMod val="75000"/>
+                <a:alpha val="66000"/>
               </a:schemeClr>
             </a:solidFill>
             <a:ln>
@@ -5145,7 +5155,7 @@
         </p:sp>
         <p:sp>
           <p:nvSpPr>
-            <p:cNvPr id="29" name="Isosceles Triangle 28"/>
+            <p:cNvPr id="19" name="Isosceles Triangle 18"/>
             <p:cNvSpPr/>
             <p:nvPr/>
           </p:nvSpPr>
@@ -5161,7 +5171,7 @@
             </a:prstGeom>
             <a:solidFill>
               <a:schemeClr val="accent1">
-                <a:alpha val="85000"/>
+                <a:alpha val="70000"/>
               </a:schemeClr>
             </a:solidFill>
             <a:ln>
@@ -5315,7 +5325,7 @@
           <a:p>
             <a:fld id="{E5B832BA-C66E-4618-9CDA-BB5B0FBA9FBA}" type="datetimeFigureOut">
               <a:rPr lang="en-CA" smtClean="0"/>
-              <a:t>2020-03-29</a:t>
+              <a:t>2020-04-04</a:t>
             </a:fld>
             <a:endParaRPr lang="en-CA"/>
           </a:p>
@@ -5400,28 +5410,28 @@
     </p:spTree>
     <p:extLst>
       <p:ext uri="{BB962C8B-B14F-4D97-AF65-F5344CB8AC3E}">
-        <p14:creationId xmlns:p14="http://schemas.microsoft.com/office/powerpoint/2010/main" val="422135859"/>
+        <p14:creationId xmlns:p14="http://schemas.microsoft.com/office/powerpoint/2010/main" val="2926337846"/>
       </p:ext>
     </p:extLst>
   </p:cSld>
   <p:clrMap bg1="lt1" tx1="dk1" bg2="lt2" tx2="dk2" accent1="accent1" accent2="accent2" accent3="accent3" accent4="accent4" accent5="accent5" accent6="accent6" hlink="hlink" folHlink="folHlink"/>
   <p:sldLayoutIdLst>
-    <p:sldLayoutId id="2147483685" r:id="rId1"/>
-    <p:sldLayoutId id="2147483686" r:id="rId2"/>
-    <p:sldLayoutId id="2147483687" r:id="rId3"/>
-    <p:sldLayoutId id="2147483688" r:id="rId4"/>
-    <p:sldLayoutId id="2147483689" r:id="rId5"/>
-    <p:sldLayoutId id="2147483690" r:id="rId6"/>
-    <p:sldLayoutId id="2147483691" r:id="rId7"/>
-    <p:sldLayoutId id="2147483692" r:id="rId8"/>
-    <p:sldLayoutId id="2147483693" r:id="rId9"/>
-    <p:sldLayoutId id="2147483694" r:id="rId10"/>
-    <p:sldLayoutId id="2147483695" r:id="rId11"/>
-    <p:sldLayoutId id="2147483696" r:id="rId12"/>
-    <p:sldLayoutId id="2147483697" r:id="rId13"/>
-    <p:sldLayoutId id="2147483698" r:id="rId14"/>
-    <p:sldLayoutId id="2147483699" r:id="rId15"/>
-    <p:sldLayoutId id="2147483700" r:id="rId16"/>
+    <p:sldLayoutId id="2147483702" r:id="rId1"/>
+    <p:sldLayoutId id="2147483703" r:id="rId2"/>
+    <p:sldLayoutId id="2147483704" r:id="rId3"/>
+    <p:sldLayoutId id="2147483705" r:id="rId4"/>
+    <p:sldLayoutId id="2147483706" r:id="rId5"/>
+    <p:sldLayoutId id="2147483707" r:id="rId6"/>
+    <p:sldLayoutId id="2147483708" r:id="rId7"/>
+    <p:sldLayoutId id="2147483709" r:id="rId8"/>
+    <p:sldLayoutId id="2147483710" r:id="rId9"/>
+    <p:sldLayoutId id="2147483711" r:id="rId10"/>
+    <p:sldLayoutId id="2147483712" r:id="rId11"/>
+    <p:sldLayoutId id="2147483713" r:id="rId12"/>
+    <p:sldLayoutId id="2147483714" r:id="rId13"/>
+    <p:sldLayoutId id="2147483715" r:id="rId14"/>
+    <p:sldLayoutId id="2147483716" r:id="rId15"/>
+    <p:sldLayoutId id="2147483717" r:id="rId16"/>
   </p:sldLayoutIdLst>
   <p:txStyles>
     <p:titleStyle>
@@ -5923,6 +5933,42 @@
           </a:p>
         </p:txBody>
       </p:sp>
+      <p:pic>
+        <p:nvPicPr>
+          <p:cNvPr id="5" name="Picture 4">
+            <a:extLst>
+              <a:ext uri="{FF2B5EF4-FFF2-40B4-BE49-F238E27FC236}">
+                <a16:creationId xmlns:a16="http://schemas.microsoft.com/office/drawing/2014/main" id="{1A143699-2159-49BB-83E6-634318046E98}"/>
+              </a:ext>
+            </a:extLst>
+          </p:cNvPr>
+          <p:cNvPicPr>
+            <a:picLocks noChangeAspect="1"/>
+          </p:cNvPicPr>
+          <p:nvPr/>
+        </p:nvPicPr>
+        <p:blipFill>
+          <a:blip r:embed="rId2">
+            <a:extLst>
+              <a:ext uri="{28A0092B-C50C-407E-A947-70E740481C1C}">
+                <a14:useLocalDpi xmlns:a14="http://schemas.microsoft.com/office/drawing/2010/main" val="0"/>
+              </a:ext>
+            </a:extLst>
+          </a:blip>
+          <a:stretch>
+            <a:fillRect/>
+          </a:stretch>
+        </p:blipFill>
+        <p:spPr>
+          <a:xfrm>
+            <a:off x="9534428" y="5901274"/>
+            <a:ext cx="2657572" cy="956726"/>
+          </a:xfrm>
+          <a:prstGeom prst="rect">
+            <a:avLst/>
+          </a:prstGeom>
+        </p:spPr>
+      </p:pic>
     </p:spTree>
     <p:extLst>
       <p:ext uri="{BB962C8B-B14F-4D97-AF65-F5344CB8AC3E}">
@@ -6103,6 +6149,42 @@
           </a:prstGeom>
         </p:spPr>
       </p:pic>
+      <p:pic>
+        <p:nvPicPr>
+          <p:cNvPr id="5" name="Picture 4">
+            <a:extLst>
+              <a:ext uri="{FF2B5EF4-FFF2-40B4-BE49-F238E27FC236}">
+                <a16:creationId xmlns:a16="http://schemas.microsoft.com/office/drawing/2014/main" id="{DFFC3E5F-A640-428F-8ADE-16FA1B34CCAF}"/>
+              </a:ext>
+            </a:extLst>
+          </p:cNvPr>
+          <p:cNvPicPr>
+            <a:picLocks noChangeAspect="1"/>
+          </p:cNvPicPr>
+          <p:nvPr/>
+        </p:nvPicPr>
+        <p:blipFill>
+          <a:blip r:embed="rId3">
+            <a:extLst>
+              <a:ext uri="{28A0092B-C50C-407E-A947-70E740481C1C}">
+                <a14:useLocalDpi xmlns:a14="http://schemas.microsoft.com/office/drawing/2010/main" val="0"/>
+              </a:ext>
+            </a:extLst>
+          </a:blip>
+          <a:stretch>
+            <a:fillRect/>
+          </a:stretch>
+        </p:blipFill>
+        <p:spPr>
+          <a:xfrm>
+            <a:off x="9534428" y="5901274"/>
+            <a:ext cx="2657572" cy="956726"/>
+          </a:xfrm>
+          <a:prstGeom prst="rect">
+            <a:avLst/>
+          </a:prstGeom>
+        </p:spPr>
+      </p:pic>
     </p:spTree>
     <p:extLst>
       <p:ext uri="{BB962C8B-B14F-4D97-AF65-F5344CB8AC3E}">
@@ -6135,6 +6217,34 @@
       </p:grpSpPr>
       <p:sp>
         <p:nvSpPr>
+          <p:cNvPr id="5" name="Title 4">
+            <a:extLst>
+              <a:ext uri="{FF2B5EF4-FFF2-40B4-BE49-F238E27FC236}">
+                <a16:creationId xmlns:a16="http://schemas.microsoft.com/office/drawing/2014/main" id="{6508F712-A4BE-4D53-9969-6568A789666C}"/>
+              </a:ext>
+            </a:extLst>
+          </p:cNvPr>
+          <p:cNvSpPr>
+            <a:spLocks noGrp="1"/>
+          </p:cNvSpPr>
+          <p:nvPr>
+            <p:ph type="title"/>
+          </p:nvPr>
+        </p:nvSpPr>
+        <p:spPr/>
+        <p:txBody>
+          <a:bodyPr/>
+          <a:lstStyle/>
+          <a:p>
+            <a:r>
+              <a:rPr lang="en-CA" dirty="0"/>
+              <a:t> </a:t>
+            </a:r>
+          </a:p>
+        </p:txBody>
+      </p:sp>
+      <p:sp>
+        <p:nvSpPr>
           <p:cNvPr id="3" name="Content Placeholder 2">
             <a:extLst>
               <a:ext uri="{FF2B5EF4-FFF2-40B4-BE49-F238E27FC236}">
@@ -6214,34 +6324,42 @@
           </a:p>
         </p:txBody>
       </p:sp>
-      <p:sp>
-        <p:nvSpPr>
-          <p:cNvPr id="5" name="Title 4">
+      <p:pic>
+        <p:nvPicPr>
+          <p:cNvPr id="4" name="Picture 3">
             <a:extLst>
               <a:ext uri="{FF2B5EF4-FFF2-40B4-BE49-F238E27FC236}">
-                <a16:creationId xmlns:a16="http://schemas.microsoft.com/office/drawing/2014/main" id="{6508F712-A4BE-4D53-9969-6568A789666C}"/>
+                <a16:creationId xmlns:a16="http://schemas.microsoft.com/office/drawing/2014/main" id="{D0AB7B3E-9D94-4684-9AB5-15A9FC2DBEC7}"/>
               </a:ext>
             </a:extLst>
           </p:cNvPr>
-          <p:cNvSpPr>
-            <a:spLocks noGrp="1"/>
-          </p:cNvSpPr>
-          <p:nvPr>
-            <p:ph type="title"/>
-          </p:nvPr>
-        </p:nvSpPr>
-        <p:spPr/>
-        <p:txBody>
-          <a:bodyPr/>
-          <a:lstStyle/>
-          <a:p>
-            <a:r>
-              <a:rPr lang="en-CA" dirty="0"/>
-              <a:t> </a:t>
-            </a:r>
-          </a:p>
-        </p:txBody>
-      </p:sp>
+          <p:cNvPicPr>
+            <a:picLocks noChangeAspect="1"/>
+          </p:cNvPicPr>
+          <p:nvPr/>
+        </p:nvPicPr>
+        <p:blipFill>
+          <a:blip r:embed="rId2">
+            <a:extLst>
+              <a:ext uri="{28A0092B-C50C-407E-A947-70E740481C1C}">
+                <a14:useLocalDpi xmlns:a14="http://schemas.microsoft.com/office/drawing/2010/main" val="0"/>
+              </a:ext>
+            </a:extLst>
+          </a:blip>
+          <a:stretch>
+            <a:fillRect/>
+          </a:stretch>
+        </p:blipFill>
+        <p:spPr>
+          <a:xfrm>
+            <a:off x="9534428" y="5901274"/>
+            <a:ext cx="2657572" cy="956726"/>
+          </a:xfrm>
+          <a:prstGeom prst="rect">
+            <a:avLst/>
+          </a:prstGeom>
+        </p:spPr>
+      </p:pic>
     </p:spTree>
     <p:extLst>
       <p:ext uri="{BB962C8B-B14F-4D97-AF65-F5344CB8AC3E}">
@@ -6421,6 +6539,42 @@
           </a:p>
         </p:txBody>
       </p:sp>
+      <p:pic>
+        <p:nvPicPr>
+          <p:cNvPr id="5" name="Picture 4">
+            <a:extLst>
+              <a:ext uri="{FF2B5EF4-FFF2-40B4-BE49-F238E27FC236}">
+                <a16:creationId xmlns:a16="http://schemas.microsoft.com/office/drawing/2014/main" id="{C7DBEFE1-010B-42F3-B8C0-C24C3E7F173D}"/>
+              </a:ext>
+            </a:extLst>
+          </p:cNvPr>
+          <p:cNvPicPr>
+            <a:picLocks noChangeAspect="1"/>
+          </p:cNvPicPr>
+          <p:nvPr/>
+        </p:nvPicPr>
+        <p:blipFill>
+          <a:blip r:embed="rId3">
+            <a:extLst>
+              <a:ext uri="{28A0092B-C50C-407E-A947-70E740481C1C}">
+                <a14:useLocalDpi xmlns:a14="http://schemas.microsoft.com/office/drawing/2010/main" val="0"/>
+              </a:ext>
+            </a:extLst>
+          </a:blip>
+          <a:stretch>
+            <a:fillRect/>
+          </a:stretch>
+        </p:blipFill>
+        <p:spPr>
+          <a:xfrm>
+            <a:off x="9534428" y="5901274"/>
+            <a:ext cx="2657572" cy="956726"/>
+          </a:xfrm>
+          <a:prstGeom prst="rect">
+            <a:avLst/>
+          </a:prstGeom>
+        </p:spPr>
+      </p:pic>
     </p:spTree>
     <p:extLst>
       <p:ext uri="{BB962C8B-B14F-4D97-AF65-F5344CB8AC3E}">
@@ -6589,6 +6743,42 @@
           </a:p>
         </p:txBody>
       </p:sp>
+      <p:pic>
+        <p:nvPicPr>
+          <p:cNvPr id="5" name="Picture 4">
+            <a:extLst>
+              <a:ext uri="{FF2B5EF4-FFF2-40B4-BE49-F238E27FC236}">
+                <a16:creationId xmlns:a16="http://schemas.microsoft.com/office/drawing/2014/main" id="{B804B551-2240-4C2A-84A9-8580B2B5388A}"/>
+              </a:ext>
+            </a:extLst>
+          </p:cNvPr>
+          <p:cNvPicPr>
+            <a:picLocks noChangeAspect="1"/>
+          </p:cNvPicPr>
+          <p:nvPr/>
+        </p:nvPicPr>
+        <p:blipFill>
+          <a:blip r:embed="rId2">
+            <a:extLst>
+              <a:ext uri="{28A0092B-C50C-407E-A947-70E740481C1C}">
+                <a14:useLocalDpi xmlns:a14="http://schemas.microsoft.com/office/drawing/2010/main" val="0"/>
+              </a:ext>
+            </a:extLst>
+          </a:blip>
+          <a:stretch>
+            <a:fillRect/>
+          </a:stretch>
+        </p:blipFill>
+        <p:spPr>
+          <a:xfrm>
+            <a:off x="9534428" y="5901274"/>
+            <a:ext cx="2657572" cy="956726"/>
+          </a:xfrm>
+          <a:prstGeom prst="rect">
+            <a:avLst/>
+          </a:prstGeom>
+        </p:spPr>
+      </p:pic>
     </p:spTree>
     <p:extLst>
       <p:ext uri="{BB962C8B-B14F-4D97-AF65-F5344CB8AC3E}">
@@ -6794,6 +6984,42 @@
           </a:p>
         </p:txBody>
       </p:sp>
+      <p:pic>
+        <p:nvPicPr>
+          <p:cNvPr id="5" name="Picture 4">
+            <a:extLst>
+              <a:ext uri="{FF2B5EF4-FFF2-40B4-BE49-F238E27FC236}">
+                <a16:creationId xmlns:a16="http://schemas.microsoft.com/office/drawing/2014/main" id="{506193B0-D684-41FB-9EE5-3A2300775B91}"/>
+              </a:ext>
+            </a:extLst>
+          </p:cNvPr>
+          <p:cNvPicPr>
+            <a:picLocks noChangeAspect="1"/>
+          </p:cNvPicPr>
+          <p:nvPr/>
+        </p:nvPicPr>
+        <p:blipFill>
+          <a:blip r:embed="rId2">
+            <a:extLst>
+              <a:ext uri="{28A0092B-C50C-407E-A947-70E740481C1C}">
+                <a14:useLocalDpi xmlns:a14="http://schemas.microsoft.com/office/drawing/2010/main" val="0"/>
+              </a:ext>
+            </a:extLst>
+          </a:blip>
+          <a:stretch>
+            <a:fillRect/>
+          </a:stretch>
+        </p:blipFill>
+        <p:spPr>
+          <a:xfrm>
+            <a:off x="9534428" y="5901274"/>
+            <a:ext cx="2657572" cy="956726"/>
+          </a:xfrm>
+          <a:prstGeom prst="rect">
+            <a:avLst/>
+          </a:prstGeom>
+        </p:spPr>
+      </p:pic>
     </p:spTree>
     <p:extLst>
       <p:ext uri="{BB962C8B-B14F-4D97-AF65-F5344CB8AC3E}">
@@ -7002,6 +7228,42 @@
           </a:prstGeom>
         </p:spPr>
       </p:pic>
+      <p:pic>
+        <p:nvPicPr>
+          <p:cNvPr id="6" name="Picture 5">
+            <a:extLst>
+              <a:ext uri="{FF2B5EF4-FFF2-40B4-BE49-F238E27FC236}">
+                <a16:creationId xmlns:a16="http://schemas.microsoft.com/office/drawing/2014/main" id="{0FF1205D-3C47-4711-91D8-672605843160}"/>
+              </a:ext>
+            </a:extLst>
+          </p:cNvPr>
+          <p:cNvPicPr>
+            <a:picLocks noChangeAspect="1"/>
+          </p:cNvPicPr>
+          <p:nvPr/>
+        </p:nvPicPr>
+        <p:blipFill>
+          <a:blip r:embed="rId4">
+            <a:extLst>
+              <a:ext uri="{28A0092B-C50C-407E-A947-70E740481C1C}">
+                <a14:useLocalDpi xmlns:a14="http://schemas.microsoft.com/office/drawing/2010/main" val="0"/>
+              </a:ext>
+            </a:extLst>
+          </a:blip>
+          <a:stretch>
+            <a:fillRect/>
+          </a:stretch>
+        </p:blipFill>
+        <p:spPr>
+          <a:xfrm>
+            <a:off x="9534428" y="5901274"/>
+            <a:ext cx="2657572" cy="956726"/>
+          </a:xfrm>
+          <a:prstGeom prst="rect">
+            <a:avLst/>
+          </a:prstGeom>
+        </p:spPr>
+      </p:pic>
     </p:spTree>
     <p:extLst>
       <p:ext uri="{BB962C8B-B14F-4D97-AF65-F5344CB8AC3E}">
@@ -7387,6 +7649,42 @@
           </a:p>
         </p:txBody>
       </p:sp>
+      <p:pic>
+        <p:nvPicPr>
+          <p:cNvPr id="6" name="Picture 5">
+            <a:extLst>
+              <a:ext uri="{FF2B5EF4-FFF2-40B4-BE49-F238E27FC236}">
+                <a16:creationId xmlns:a16="http://schemas.microsoft.com/office/drawing/2014/main" id="{4E6A4A7E-AC10-4547-A63C-469D81A5A4D4}"/>
+              </a:ext>
+            </a:extLst>
+          </p:cNvPr>
+          <p:cNvPicPr>
+            <a:picLocks noChangeAspect="1"/>
+          </p:cNvPicPr>
+          <p:nvPr/>
+        </p:nvPicPr>
+        <p:blipFill>
+          <a:blip r:embed="rId2">
+            <a:extLst>
+              <a:ext uri="{28A0092B-C50C-407E-A947-70E740481C1C}">
+                <a14:useLocalDpi xmlns:a14="http://schemas.microsoft.com/office/drawing/2010/main" val="0"/>
+              </a:ext>
+            </a:extLst>
+          </a:blip>
+          <a:stretch>
+            <a:fillRect/>
+          </a:stretch>
+        </p:blipFill>
+        <p:spPr>
+          <a:xfrm>
+            <a:off x="9534428" y="5901274"/>
+            <a:ext cx="2657572" cy="956726"/>
+          </a:xfrm>
+          <a:prstGeom prst="rect">
+            <a:avLst/>
+          </a:prstGeom>
+        </p:spPr>
+      </p:pic>
     </p:spTree>
     <p:extLst>
       <p:ext uri="{BB962C8B-B14F-4D97-AF65-F5344CB8AC3E}">
@@ -7618,6 +7916,42 @@
           </a:prstGeom>
         </p:spPr>
       </p:pic>
+      <p:pic>
+        <p:nvPicPr>
+          <p:cNvPr id="6" name="Picture 5">
+            <a:extLst>
+              <a:ext uri="{FF2B5EF4-FFF2-40B4-BE49-F238E27FC236}">
+                <a16:creationId xmlns:a16="http://schemas.microsoft.com/office/drawing/2014/main" id="{A7C2DBF1-3485-4A27-87CA-2C2AE628A09F}"/>
+              </a:ext>
+            </a:extLst>
+          </p:cNvPr>
+          <p:cNvPicPr>
+            <a:picLocks noChangeAspect="1"/>
+          </p:cNvPicPr>
+          <p:nvPr/>
+        </p:nvPicPr>
+        <p:blipFill>
+          <a:blip r:embed="rId3">
+            <a:extLst>
+              <a:ext uri="{28A0092B-C50C-407E-A947-70E740481C1C}">
+                <a14:useLocalDpi xmlns:a14="http://schemas.microsoft.com/office/drawing/2010/main" val="0"/>
+              </a:ext>
+            </a:extLst>
+          </a:blip>
+          <a:stretch>
+            <a:fillRect/>
+          </a:stretch>
+        </p:blipFill>
+        <p:spPr>
+          <a:xfrm>
+            <a:off x="9534428" y="5901274"/>
+            <a:ext cx="2657572" cy="956726"/>
+          </a:xfrm>
+          <a:prstGeom prst="rect">
+            <a:avLst/>
+          </a:prstGeom>
+        </p:spPr>
+      </p:pic>
     </p:spTree>
     <p:extLst>
       <p:ext uri="{BB962C8B-B14F-4D97-AF65-F5344CB8AC3E}">
@@ -8122,6 +8456,42 @@
           </a:p>
         </p:txBody>
       </p:sp>
+      <p:pic>
+        <p:nvPicPr>
+          <p:cNvPr id="5" name="Picture 4">
+            <a:extLst>
+              <a:ext uri="{FF2B5EF4-FFF2-40B4-BE49-F238E27FC236}">
+                <a16:creationId xmlns:a16="http://schemas.microsoft.com/office/drawing/2014/main" id="{CFC9A64D-DA19-49ED-AD68-40F7EB034507}"/>
+              </a:ext>
+            </a:extLst>
+          </p:cNvPr>
+          <p:cNvPicPr>
+            <a:picLocks noChangeAspect="1"/>
+          </p:cNvPicPr>
+          <p:nvPr/>
+        </p:nvPicPr>
+        <p:blipFill>
+          <a:blip r:embed="rId2">
+            <a:extLst>
+              <a:ext uri="{28A0092B-C50C-407E-A947-70E740481C1C}">
+                <a14:useLocalDpi xmlns:a14="http://schemas.microsoft.com/office/drawing/2010/main" val="0"/>
+              </a:ext>
+            </a:extLst>
+          </a:blip>
+          <a:stretch>
+            <a:fillRect/>
+          </a:stretch>
+        </p:blipFill>
+        <p:spPr>
+          <a:xfrm>
+            <a:off x="9534428" y="5901274"/>
+            <a:ext cx="2657572" cy="956726"/>
+          </a:xfrm>
+          <a:prstGeom prst="rect">
+            <a:avLst/>
+          </a:prstGeom>
+        </p:spPr>
+      </p:pic>
     </p:spTree>
     <p:extLst>
       <p:ext uri="{BB962C8B-B14F-4D97-AF65-F5344CB8AC3E}">
@@ -8361,6 +8731,42 @@
           </p:txBody>
         </p:sp>
       </p:grpSp>
+      <p:pic>
+        <p:nvPicPr>
+          <p:cNvPr id="7" name="Picture 6">
+            <a:extLst>
+              <a:ext uri="{FF2B5EF4-FFF2-40B4-BE49-F238E27FC236}">
+                <a16:creationId xmlns:a16="http://schemas.microsoft.com/office/drawing/2014/main" id="{A228A19F-7B27-46FD-B02D-C399EF4AF618}"/>
+              </a:ext>
+            </a:extLst>
+          </p:cNvPr>
+          <p:cNvPicPr>
+            <a:picLocks noChangeAspect="1"/>
+          </p:cNvPicPr>
+          <p:nvPr/>
+        </p:nvPicPr>
+        <p:blipFill>
+          <a:blip r:embed="rId3">
+            <a:extLst>
+              <a:ext uri="{28A0092B-C50C-407E-A947-70E740481C1C}">
+                <a14:useLocalDpi xmlns:a14="http://schemas.microsoft.com/office/drawing/2010/main" val="0"/>
+              </a:ext>
+            </a:extLst>
+          </a:blip>
+          <a:stretch>
+            <a:fillRect/>
+          </a:stretch>
+        </p:blipFill>
+        <p:spPr>
+          <a:xfrm>
+            <a:off x="9534428" y="5901274"/>
+            <a:ext cx="2657572" cy="956726"/>
+          </a:xfrm>
+          <a:prstGeom prst="rect">
+            <a:avLst/>
+          </a:prstGeom>
+        </p:spPr>
+      </p:pic>
     </p:spTree>
     <p:extLst>
       <p:ext uri="{BB962C8B-B14F-4D97-AF65-F5344CB8AC3E}">
@@ -8625,7 +9031,7 @@
   <a:extraClrSchemeLst/>
   <a:extLst>
     <a:ext uri="{05A4C25C-085E-4340-85A3-A5531E510DB2}">
-      <thm15:themeFamily xmlns:thm15="http://schemas.microsoft.com/office/thememl/2012/main" name="Facet" id="{C0C680CD-088A-49FC-A102-D699147F32B2}" vid="{CFBC31BA-B70F-4F30-BCAA-4F3011E16C4D}"/>
+      <thm15:themeFamily xmlns:thm15="http://schemas.microsoft.com/office/thememl/2012/main" name="Facet" id="{C0C680CD-088A-49FC-A102-D699147F32B2}" vid="{0B5AB586-D108-4FC1-8368-649FE654B894}"/>
     </a:ext>
   </a:extLst>
 </a:theme>

</xml_diff>